<commit_message>
Update 20151167 이인재 컴퓨터네트워크 2-4실습 과제(UDP, TCP).pptx
</commit_message>
<xml_diff>
--- a/ComputerNetwork/2-4/20151167 이인재 컴퓨터네트워크 2-4실습 과제(UDP, TCP).pptx
+++ b/ComputerNetwork/2-4/20151167 이인재 컴퓨터네트워크 2-4실습 과제(UDP, TCP).pptx
@@ -12,8 +12,9 @@
     <p:sldId id="454" r:id="rId6"/>
     <p:sldId id="455" r:id="rId7"/>
     <p:sldId id="456" r:id="rId8"/>
-    <p:sldId id="450" r:id="rId9"/>
-    <p:sldId id="414" r:id="rId10"/>
+    <p:sldId id="457" r:id="rId9"/>
+    <p:sldId id="450" r:id="rId10"/>
+    <p:sldId id="414" r:id="rId11"/>
   </p:sldIdLst>
   <p:sldSz cx="9906000" cy="6858000" type="A4"/>
   <p:notesSz cx="6858000" cy="9144000"/>
@@ -3582,6 +3583,124 @@
 </p:sld>
 </file>
 
+<file path=ppt/slides/slide10.xml><?xml version="1.0" encoding="utf-8"?>
+<p:sld xmlns:a="http://schemas.openxmlformats.org/drawingml/2006/main" xmlns:r="http://schemas.openxmlformats.org/officeDocument/2006/relationships" xmlns:p="http://schemas.openxmlformats.org/presentationml/2006/main">
+  <p:cSld>
+    <p:bg>
+      <p:bgPr>
+        <a:blipFill dpi="0" rotWithShape="1">
+          <a:blip r:embed="rId2">
+            <a:lum/>
+          </a:blip>
+          <a:srcRect/>
+          <a:stretch>
+            <a:fillRect/>
+          </a:stretch>
+        </a:blipFill>
+        <a:effectLst/>
+      </p:bgPr>
+    </p:bg>
+    <p:spTree>
+      <p:nvGrpSpPr>
+        <p:cNvPr id="1" name=""/>
+        <p:cNvGrpSpPr/>
+        <p:nvPr/>
+      </p:nvGrpSpPr>
+      <p:grpSpPr>
+        <a:xfrm>
+          <a:off x="0" y="0"/>
+          <a:ext cx="0" cy="0"/>
+          <a:chOff x="0" y="0"/>
+          <a:chExt cx="0" cy="0"/>
+        </a:xfrm>
+      </p:grpSpPr>
+      <p:sp>
+        <p:nvSpPr>
+          <p:cNvPr id="4" name="직사각형 3"/>
+          <p:cNvSpPr/>
+          <p:nvPr/>
+        </p:nvSpPr>
+        <p:spPr>
+          <a:xfrm>
+            <a:off x="3342687" y="2951946"/>
+            <a:ext cx="3220625" cy="477054"/>
+          </a:xfrm>
+          <a:prstGeom prst="rect">
+            <a:avLst/>
+          </a:prstGeom>
+        </p:spPr>
+        <p:txBody>
+          <a:bodyPr wrap="none">
+            <a:spAutoFit/>
+          </a:bodyPr>
+          <a:lstStyle/>
+          <a:p>
+            <a:r>
+              <a:rPr lang="en-US" altLang="ko-KR" sz="2500" dirty="0">
+                <a:solidFill>
+                  <a:prstClr val="white">
+                    <a:lumMod val="95000"/>
+                  </a:prstClr>
+                </a:solidFill>
+              </a:rPr>
+              <a:t>Thank</a:t>
+            </a:r>
+            <a:r>
+              <a:rPr lang="ko-KR" altLang="en-US" sz="2500" dirty="0">
+                <a:solidFill>
+                  <a:prstClr val="white">
+                    <a:lumMod val="95000"/>
+                  </a:prstClr>
+                </a:solidFill>
+              </a:rPr>
+              <a:t> </a:t>
+            </a:r>
+            <a:r>
+              <a:rPr lang="en-US" altLang="ko-KR" sz="2500" dirty="0">
+                <a:solidFill>
+                  <a:prstClr val="white">
+                    <a:lumMod val="95000"/>
+                  </a:prstClr>
+                </a:solidFill>
+              </a:rPr>
+              <a:t>you</a:t>
+            </a:r>
+            <a:r>
+              <a:rPr lang="ko-KR" altLang="en-US" sz="2500" dirty="0">
+                <a:solidFill>
+                  <a:prstClr val="white">
+                    <a:lumMod val="95000"/>
+                  </a:prstClr>
+                </a:solidFill>
+              </a:rPr>
+              <a:t> </a:t>
+            </a:r>
+            <a:r>
+              <a:rPr lang="en-US" altLang="ko-KR" sz="2500" dirty="0">
+                <a:solidFill>
+                  <a:prstClr val="white">
+                    <a:lumMod val="95000"/>
+                  </a:prstClr>
+                </a:solidFill>
+              </a:rPr>
+              <a:t>for watching</a:t>
+            </a:r>
+          </a:p>
+        </p:txBody>
+      </p:sp>
+    </p:spTree>
+    <p:extLst>
+      <p:ext uri="{BB962C8B-B14F-4D97-AF65-F5344CB8AC3E}">
+        <p14:creationId xmlns:p14="http://schemas.microsoft.com/office/powerpoint/2010/main" val="4290430429"/>
+      </p:ext>
+    </p:extLst>
+  </p:cSld>
+  <p:clrMapOvr>
+    <a:masterClrMapping/>
+  </p:clrMapOvr>
+</p:sld>
+</file>
+
 <file path=ppt/slides/slide2.xml><?xml version="1.0" encoding="utf-8"?>
 <p:sld xmlns:a="http://schemas.openxmlformats.org/drawingml/2006/main" xmlns:r="http://schemas.openxmlformats.org/officeDocument/2006/relationships" xmlns:p="http://schemas.openxmlformats.org/presentationml/2006/main">
   <p:cSld>
@@ -7500,9 +7619,35 @@
                 <a:latin typeface="아리따-돋움(TTF)-Bold" panose="02020603020101020101" pitchFamily="18" charset="-127"/>
                 <a:ea typeface="아리따-돋움(TTF)-Bold" panose="02020603020101020101" pitchFamily="18" charset="-127"/>
               </a:rPr>
-              <a:t>패킷 캡쳐를 통해 </a:t>
-            </a:r>
-            <a:endParaRPr lang="en-US" altLang="ko-KR" sz="1050">
+              <a:t>패킷 캡쳐를 통해 비연결형 </a:t>
+            </a:r>
+            <a:r>
+              <a:rPr lang="en-US" altLang="ko-KR" sz="1050" dirty="0">
+                <a:solidFill>
+                  <a:prstClr val="black">
+                    <a:lumMod val="85000"/>
+                    <a:lumOff val="15000"/>
+                  </a:prstClr>
+                </a:solidFill>
+                <a:latin typeface="아리따-돋움(TTF)-Bold" panose="02020603020101020101" pitchFamily="18" charset="-127"/>
+                <a:ea typeface="아리따-돋움(TTF)-Bold" panose="02020603020101020101" pitchFamily="18" charset="-127"/>
+              </a:rPr>
+              <a:t>UDP</a:t>
+            </a:r>
+            <a:r>
+              <a:rPr lang="ko-KR" altLang="en-US" sz="1050" dirty="0">
+                <a:solidFill>
+                  <a:prstClr val="black">
+                    <a:lumMod val="85000"/>
+                    <a:lumOff val="15000"/>
+                  </a:prstClr>
+                </a:solidFill>
+                <a:latin typeface="아리따-돋움(TTF)-Bold" panose="02020603020101020101" pitchFamily="18" charset="-127"/>
+                <a:ea typeface="아리따-돋움(TTF)-Bold" panose="02020603020101020101" pitchFamily="18" charset="-127"/>
+              </a:rPr>
+              <a:t>통신을 통해</a:t>
+            </a:r>
+            <a:endParaRPr lang="en-US" altLang="ko-KR" sz="1050" dirty="0">
               <a:solidFill>
                 <a:prstClr val="black">
                   <a:lumMod val="85000"/>
@@ -7521,19 +7666,6 @@
               <a:defRPr/>
             </a:pPr>
             <a:r>
-              <a:rPr lang="en-US" altLang="ko-KR" sz="1050">
-                <a:solidFill>
-                  <a:prstClr val="black">
-                    <a:lumMod val="85000"/>
-                    <a:lumOff val="15000"/>
-                  </a:prstClr>
-                </a:solidFill>
-                <a:latin typeface="아리따-돋움(TTF)-Bold" panose="02020603020101020101" pitchFamily="18" charset="-127"/>
-                <a:ea typeface="아리따-돋움(TTF)-Bold" panose="02020603020101020101" pitchFamily="18" charset="-127"/>
-              </a:rPr>
-              <a:t>127.0.0.1</a:t>
-            </a:r>
-            <a:r>
               <a:rPr lang="en-US" altLang="ko-KR" sz="1050" dirty="0">
                 <a:solidFill>
                   <a:prstClr val="black">
@@ -7544,7 +7676,7 @@
                 <a:latin typeface="아리따-돋움(TTF)-Bold" panose="02020603020101020101" pitchFamily="18" charset="-127"/>
                 <a:ea typeface="아리따-돋움(TTF)-Bold" panose="02020603020101020101" pitchFamily="18" charset="-127"/>
               </a:rPr>
-              <a:t>, </a:t>
+              <a:t>127.0.0.1, </a:t>
             </a:r>
             <a:r>
               <a:rPr lang="ko-KR" altLang="en-US" sz="1050" dirty="0">
@@ -8042,7 +8174,7 @@
                 <a:latin typeface="아리따-돋움(TTF)-Bold" panose="02020603020101020101" pitchFamily="18" charset="-127"/>
                 <a:ea typeface="아리따-돋움(TTF)-Bold" panose="02020603020101020101" pitchFamily="18" charset="-127"/>
               </a:rPr>
-              <a:t>포트번호 선언</a:t>
+              <a:t>포트번호 선언한다</a:t>
             </a:r>
             <a:endParaRPr lang="en-US" altLang="ko-KR" sz="1100" dirty="0">
               <a:solidFill>
@@ -8170,7 +8302,7 @@
         <p:spPr>
           <a:xfrm>
             <a:off x="4508460" y="1701470"/>
-            <a:ext cx="3197877" cy="567463"/>
+            <a:ext cx="3197877" cy="821379"/>
           </a:xfrm>
           <a:prstGeom prst="rect">
             <a:avLst/>
@@ -8266,6 +8398,102 @@
                 <a:ea typeface="아리따-돋움(TTF)-Bold" panose="02020603020101020101" pitchFamily="18" charset="-127"/>
               </a:rPr>
               <a:t>와 포트를 바인딩</a:t>
+            </a:r>
+            <a:r>
+              <a:rPr lang="en-US" altLang="ko-KR" sz="1100" dirty="0">
+                <a:solidFill>
+                  <a:prstClr val="black">
+                    <a:lumMod val="85000"/>
+                    <a:lumOff val="15000"/>
+                  </a:prstClr>
+                </a:solidFill>
+                <a:latin typeface="아리따-돋움(TTF)-Bold" panose="02020603020101020101" pitchFamily="18" charset="-127"/>
+                <a:ea typeface="아리따-돋움(TTF)-Bold" panose="02020603020101020101" pitchFamily="18" charset="-127"/>
+              </a:rPr>
+              <a:t>, </a:t>
+            </a:r>
+            <a:r>
+              <a:rPr lang="ko-KR" altLang="en-US" sz="1100" dirty="0">
+                <a:solidFill>
+                  <a:prstClr val="black">
+                    <a:lumMod val="85000"/>
+                    <a:lumOff val="15000"/>
+                  </a:prstClr>
+                </a:solidFill>
+                <a:latin typeface="아리따-돋움(TTF)-Bold" panose="02020603020101020101" pitchFamily="18" charset="-127"/>
+                <a:ea typeface="아리따-돋움(TTF)-Bold" panose="02020603020101020101" pitchFamily="18" charset="-127"/>
+              </a:rPr>
+              <a:t>서버 소켓은</a:t>
+            </a:r>
+            <a:endParaRPr lang="en-US" altLang="ko-KR" sz="1100" dirty="0">
+              <a:solidFill>
+                <a:prstClr val="black">
+                  <a:lumMod val="85000"/>
+                  <a:lumOff val="15000"/>
+                </a:prstClr>
+              </a:solidFill>
+              <a:latin typeface="아리따-돋움(TTF)-Bold" panose="02020603020101020101" pitchFamily="18" charset="-127"/>
+              <a:ea typeface="아리따-돋움(TTF)-Bold" panose="02020603020101020101" pitchFamily="18" charset="-127"/>
+            </a:endParaRPr>
+          </a:p>
+          <a:p>
+            <a:pPr lvl="0">
+              <a:lnSpc>
+                <a:spcPct val="150000"/>
+              </a:lnSpc>
+              <a:defRPr/>
+            </a:pPr>
+            <a:r>
+              <a:rPr lang="en-US" altLang="ko-KR" sz="1100" dirty="0">
+                <a:solidFill>
+                  <a:prstClr val="black">
+                    <a:lumMod val="85000"/>
+                    <a:lumOff val="15000"/>
+                  </a:prstClr>
+                </a:solidFill>
+                <a:latin typeface="아리따-돋움(TTF)-Bold" panose="02020603020101020101" pitchFamily="18" charset="-127"/>
+                <a:ea typeface="아리따-돋움(TTF)-Bold" panose="02020603020101020101" pitchFamily="18" charset="-127"/>
+              </a:rPr>
+              <a:t>Listen</a:t>
+            </a:r>
+            <a:r>
+              <a:rPr lang="ko-KR" altLang="en-US" sz="1100" dirty="0">
+                <a:solidFill>
+                  <a:prstClr val="black">
+                    <a:lumMod val="85000"/>
+                    <a:lumOff val="15000"/>
+                  </a:prstClr>
+                </a:solidFill>
+                <a:latin typeface="아리따-돋움(TTF)-Bold" panose="02020603020101020101" pitchFamily="18" charset="-127"/>
+                <a:ea typeface="아리따-돋움(TTF)-Bold" panose="02020603020101020101" pitchFamily="18" charset="-127"/>
+              </a:rPr>
+              <a:t>을 통해 큐에 </a:t>
+            </a:r>
+            <a:r>
+              <a:rPr lang="en-US" altLang="ko-KR" sz="1100" dirty="0">
+                <a:solidFill>
+                  <a:prstClr val="black">
+                    <a:lumMod val="85000"/>
+                    <a:lumOff val="15000"/>
+                  </a:prstClr>
+                </a:solidFill>
+                <a:latin typeface="아리따-돋움(TTF)-Bold" panose="02020603020101020101" pitchFamily="18" charset="-127"/>
+                <a:ea typeface="아리따-돋움(TTF)-Bold" panose="02020603020101020101" pitchFamily="18" charset="-127"/>
+              </a:rPr>
+              <a:t>1</a:t>
+            </a:r>
+            <a:r>
+              <a:rPr lang="ko-KR" altLang="en-US" sz="1100" dirty="0">
+                <a:solidFill>
+                  <a:prstClr val="black">
+                    <a:lumMod val="85000"/>
+                    <a:lumOff val="15000"/>
+                  </a:prstClr>
+                </a:solidFill>
+                <a:latin typeface="아리따-돋움(TTF)-Bold" panose="02020603020101020101" pitchFamily="18" charset="-127"/>
+                <a:ea typeface="아리따-돋움(TTF)-Bold" panose="02020603020101020101" pitchFamily="18" charset="-127"/>
+              </a:rPr>
+              <a:t>개의 연결요청을 삽입한다</a:t>
             </a:r>
             <a:endParaRPr lang="en-US" altLang="ko-KR" sz="1100" dirty="0">
               <a:solidFill>
@@ -9030,7 +9258,7 @@
                 <a:latin typeface="아리따-돋움(TTF)-Bold" panose="02020603020101020101" pitchFamily="18" charset="-127"/>
                 <a:ea typeface="아리따-돋움(TTF)-Bold" panose="02020603020101020101" pitchFamily="18" charset="-127"/>
               </a:rPr>
-              <a:t>UDP</a:t>
+              <a:t>TCP</a:t>
             </a:r>
             <a:r>
               <a:rPr lang="ko-KR" altLang="en-US" sz="1100" dirty="0">
@@ -9440,6 +9668,36 @@
           </a:p>
         </p:txBody>
       </p:sp>
+      <p:pic>
+        <p:nvPicPr>
+          <p:cNvPr id="2" name="그림 1">
+            <a:extLst>
+              <a:ext uri="{FF2B5EF4-FFF2-40B4-BE49-F238E27FC236}">
+                <a16:creationId xmlns:a16="http://schemas.microsoft.com/office/drawing/2014/main" id="{56DA4699-FF18-4641-A878-BF59A9C767F4}"/>
+              </a:ext>
+            </a:extLst>
+          </p:cNvPr>
+          <p:cNvPicPr>
+            <a:picLocks noChangeAspect="1"/>
+          </p:cNvPicPr>
+          <p:nvPr/>
+        </p:nvPicPr>
+        <p:blipFill>
+          <a:blip r:embed="rId3"/>
+          <a:stretch>
+            <a:fillRect/>
+          </a:stretch>
+        </p:blipFill>
+        <p:spPr>
+          <a:xfrm>
+            <a:off x="711791" y="777110"/>
+            <a:ext cx="4111211" cy="3647646"/>
+          </a:xfrm>
+          <a:prstGeom prst="rect">
+            <a:avLst/>
+          </a:prstGeom>
+        </p:spPr>
+      </p:pic>
     </p:spTree>
     <p:extLst>
       <p:ext uri="{BB962C8B-B14F-4D97-AF65-F5344CB8AC3E}">
@@ -9492,8 +9750,8 @@
         </p:nvSpPr>
         <p:spPr>
           <a:xfrm>
-            <a:off x="500352" y="276052"/>
-            <a:ext cx="4350322" cy="400110"/>
+            <a:off x="500351" y="276052"/>
+            <a:ext cx="7258985" cy="400110"/>
           </a:xfrm>
           <a:prstGeom prst="rect">
             <a:avLst/>
@@ -9523,38 +9781,43 @@
               <a:defRPr/>
             </a:pPr>
             <a:r>
-              <a:rPr lang="ko-KR" altLang="en-US" sz="2000" dirty="0">
-                <a:solidFill>
-                  <a:prstClr val="black"/>
-                </a:solidFill>
-                <a:latin typeface="맑은 고딕" panose="020B0503020000020004" pitchFamily="50" charset="-127"/>
-                <a:ea typeface="맑은 고딕" panose="020B0503020000020004" pitchFamily="50" charset="-127"/>
-              </a:rPr>
-              <a:t>결과</a:t>
+              <a:rPr lang="en-US" altLang="ko-KR" sz="2000" dirty="0">
+                <a:solidFill>
+                  <a:schemeClr val="tx1">
+                    <a:lumMod val="65000"/>
+                    <a:lumOff val="35000"/>
+                  </a:schemeClr>
+                </a:solidFill>
+                <a:latin typeface="+mj-ea"/>
+                <a:ea typeface="+mj-ea"/>
+              </a:rPr>
+              <a:t>UDP - Result</a:t>
             </a:r>
             <a:endParaRPr kumimoji="0" lang="ko-KR" altLang="en-US" sz="2000" b="0" i="0" u="none" strike="noStrike" kern="1200" cap="none" spc="0" normalizeH="0" baseline="0" noProof="0" dirty="0">
               <a:ln>
                 <a:noFill/>
               </a:ln>
               <a:solidFill>
-                <a:prstClr val="black"/>
+                <a:schemeClr val="tx1">
+                  <a:lumMod val="65000"/>
+                  <a:lumOff val="35000"/>
+                </a:schemeClr>
               </a:solidFill>
               <a:effectLst/>
               <a:uLnTx/>
               <a:uFillTx/>
-              <a:latin typeface="맑은 고딕" panose="020B0503020000020004" pitchFamily="50" charset="-127"/>
-              <a:ea typeface="맑은 고딕" panose="020B0503020000020004" pitchFamily="50" charset="-127"/>
-              <a:cs typeface="+mn-cs"/>
+              <a:latin typeface="+mj-ea"/>
+              <a:ea typeface="+mj-ea"/>
             </a:endParaRPr>
           </a:p>
         </p:txBody>
       </p:sp>
       <p:sp>
         <p:nvSpPr>
-          <p:cNvPr id="8" name="직사각형 7">
+          <p:cNvPr id="18" name="직사각형 17">
             <a:extLst>
               <a:ext uri="{FF2B5EF4-FFF2-40B4-BE49-F238E27FC236}">
-                <a16:creationId xmlns:a16="http://schemas.microsoft.com/office/drawing/2014/main" id="{6BAA6143-2FE2-4F73-AA81-2F8AF2749F08}"/>
+                <a16:creationId xmlns:a16="http://schemas.microsoft.com/office/drawing/2014/main" id="{1AD9DBB6-C331-44E2-91ED-A377CED73C20}"/>
               </a:ext>
             </a:extLst>
           </p:cNvPr>
@@ -9563,8 +9826,8 @@
         </p:nvSpPr>
         <p:spPr>
           <a:xfrm>
-            <a:off x="1974474" y="1520100"/>
-            <a:ext cx="5922211" cy="1891352"/>
+            <a:off x="498456" y="3644314"/>
+            <a:ext cx="1535502" cy="323165"/>
           </a:xfrm>
           <a:prstGeom prst="rect">
             <a:avLst/>
@@ -9577,168 +9840,7 @@
           </a:bodyPr>
           <a:lstStyle/>
           <a:p>
-            <a:pPr marL="0" marR="0" lvl="0" indent="0" algn="ctr" defTabSz="914400" rtl="0" eaLnBrk="1" fontAlgn="auto" latinLnBrk="1" hangingPunct="1">
-              <a:lnSpc>
-                <a:spcPct val="150000"/>
-              </a:lnSpc>
-              <a:spcBef>
-                <a:spcPts val="0"/>
-              </a:spcBef>
-              <a:spcAft>
-                <a:spcPts val="0"/>
-              </a:spcAft>
-              <a:buClrTx/>
-              <a:buSzTx/>
-              <a:buFontTx/>
-              <a:buNone/>
-              <a:tabLst/>
-              <a:defRPr/>
-            </a:pPr>
-            <a:r>
-              <a:rPr lang="ko-KR" altLang="en-US" sz="1600" b="1" dirty="0">
-                <a:solidFill>
-                  <a:prstClr val="black">
-                    <a:lumMod val="85000"/>
-                    <a:lumOff val="15000"/>
-                  </a:prstClr>
-                </a:solidFill>
-                <a:latin typeface="아리따-돋움(TTF)-Bold" panose="02020603020101020101" pitchFamily="18" charset="-127"/>
-                <a:ea typeface="아리따-돋움(TTF)-Bold" panose="02020603020101020101" pitchFamily="18" charset="-127"/>
-              </a:rPr>
-              <a:t>인접 국가에 대한 추적</a:t>
-            </a:r>
-            <a:r>
-              <a:rPr lang="ko-KR" altLang="en-US" sz="1600" dirty="0">
-                <a:solidFill>
-                  <a:prstClr val="black">
-                    <a:lumMod val="85000"/>
-                    <a:lumOff val="15000"/>
-                  </a:prstClr>
-                </a:solidFill>
-                <a:latin typeface="아리따-돋움(TTF)-Bold" panose="02020603020101020101" pitchFamily="18" charset="-127"/>
-                <a:ea typeface="아리따-돋움(TTF)-Bold" panose="02020603020101020101" pitchFamily="18" charset="-127"/>
-              </a:rPr>
-              <a:t>은  적은 홉의 개수 및 라우터로 </a:t>
-            </a:r>
-            <a:endParaRPr lang="en-US" altLang="ko-KR" sz="1600" dirty="0">
-              <a:solidFill>
-                <a:prstClr val="black">
-                  <a:lumMod val="85000"/>
-                  <a:lumOff val="15000"/>
-                </a:prstClr>
-              </a:solidFill>
-              <a:latin typeface="아리따-돋움(TTF)-Bold" panose="02020603020101020101" pitchFamily="18" charset="-127"/>
-              <a:ea typeface="아리따-돋움(TTF)-Bold" panose="02020603020101020101" pitchFamily="18" charset="-127"/>
-            </a:endParaRPr>
-          </a:p>
-          <a:p>
-            <a:pPr lvl="0" algn="ctr">
-              <a:lnSpc>
-                <a:spcPct val="150000"/>
-              </a:lnSpc>
-              <a:defRPr/>
-            </a:pPr>
-            <a:r>
-              <a:rPr lang="ko-KR" altLang="en-US" sz="1600" dirty="0">
-                <a:solidFill>
-                  <a:prstClr val="black">
-                    <a:lumMod val="85000"/>
-                    <a:lumOff val="15000"/>
-                  </a:prstClr>
-                </a:solidFill>
-                <a:latin typeface="아리따-돋움(TTF)-Bold" panose="02020603020101020101" pitchFamily="18" charset="-127"/>
-                <a:ea typeface="아리따-돋움(TTF)-Bold" panose="02020603020101020101" pitchFamily="18" charset="-127"/>
-              </a:rPr>
-              <a:t>목표지점까지 도달할 수 있음을 확인 할 수 있었으며 </a:t>
-            </a:r>
-            <a:r>
-              <a:rPr lang="ko-KR" altLang="en-US" sz="1600" b="1" dirty="0">
-                <a:solidFill>
-                  <a:prstClr val="black">
-                    <a:lumMod val="85000"/>
-                    <a:lumOff val="15000"/>
-                  </a:prstClr>
-                </a:solidFill>
-                <a:latin typeface="아리따-돋움(TTF)-Bold" panose="02020603020101020101" pitchFamily="18" charset="-127"/>
-                <a:ea typeface="아리따-돋움(TTF)-Bold" panose="02020603020101020101" pitchFamily="18" charset="-127"/>
-              </a:rPr>
-              <a:t>상대적으로 먼 거리에 위치한 대륙에 대한 추적은 </a:t>
-            </a:r>
-            <a:r>
-              <a:rPr lang="ko-KR" altLang="en-US" sz="1600" dirty="0">
-                <a:solidFill>
-                  <a:prstClr val="black">
-                    <a:lumMod val="85000"/>
-                    <a:lumOff val="15000"/>
-                  </a:prstClr>
-                </a:solidFill>
-                <a:latin typeface="아리따-돋움(TTF)-Bold" panose="02020603020101020101" pitchFamily="18" charset="-127"/>
-                <a:ea typeface="아리따-돋움(TTF)-Bold" panose="02020603020101020101" pitchFamily="18" charset="-127"/>
-              </a:rPr>
-              <a:t>목표지점까지 도달함에 있어 다소 많은 홉의 개수 및 라우터를 통해 도달함을 확인할 수 있다</a:t>
-            </a:r>
-            <a:r>
-              <a:rPr lang="en-US" altLang="ko-KR" sz="1600" dirty="0">
-                <a:solidFill>
-                  <a:prstClr val="black">
-                    <a:lumMod val="85000"/>
-                    <a:lumOff val="15000"/>
-                  </a:prstClr>
-                </a:solidFill>
-                <a:latin typeface="아리따-돋움(TTF)-Bold" panose="02020603020101020101" pitchFamily="18" charset="-127"/>
-                <a:ea typeface="아리따-돋움(TTF)-Bold" panose="02020603020101020101" pitchFamily="18" charset="-127"/>
-              </a:rPr>
-              <a:t>.</a:t>
-            </a:r>
-            <a:endParaRPr kumimoji="0" lang="en-US" altLang="ko-KR" sz="1600" i="0" u="none" strike="noStrike" kern="1200" cap="none" spc="0" normalizeH="0" baseline="0" noProof="0" dirty="0">
-              <a:ln>
-                <a:noFill/>
-              </a:ln>
-              <a:solidFill>
-                <a:prstClr val="black">
-                  <a:lumMod val="85000"/>
-                  <a:lumOff val="15000"/>
-                </a:prstClr>
-              </a:solidFill>
-              <a:effectLst/>
-              <a:uLnTx/>
-              <a:uFillTx/>
-              <a:latin typeface="아리따-돋움(TTF)-Bold" panose="02020603020101020101" pitchFamily="18" charset="-127"/>
-              <a:ea typeface="아리따-돋움(TTF)-Bold" panose="02020603020101020101" pitchFamily="18" charset="-127"/>
-              <a:cs typeface="+mn-cs"/>
-            </a:endParaRPr>
-          </a:p>
-        </p:txBody>
-      </p:sp>
-      <p:sp>
-        <p:nvSpPr>
-          <p:cNvPr id="9" name="직사각형 8">
-            <a:extLst>
-              <a:ext uri="{FF2B5EF4-FFF2-40B4-BE49-F238E27FC236}">
-                <a16:creationId xmlns:a16="http://schemas.microsoft.com/office/drawing/2014/main" id="{BD2A37E6-181D-44FE-A75F-9C02BD9D1628}"/>
-              </a:ext>
-            </a:extLst>
-          </p:cNvPr>
-          <p:cNvSpPr/>
-          <p:nvPr/>
-        </p:nvSpPr>
-        <p:spPr>
-          <a:xfrm>
-            <a:off x="4095157" y="1147413"/>
-            <a:ext cx="1535502" cy="400110"/>
-          </a:xfrm>
-          <a:prstGeom prst="rect">
-            <a:avLst/>
-          </a:prstGeom>
-          <a:noFill/>
-        </p:spPr>
-        <p:txBody>
-          <a:bodyPr wrap="square">
-            <a:spAutoFit/>
-          </a:bodyPr>
-          <a:lstStyle/>
-          <a:p>
-            <a:pPr marL="0" marR="0" lvl="0" indent="0" algn="ctr" defTabSz="914400" rtl="0" eaLnBrk="1" fontAlgn="auto" latinLnBrk="1" hangingPunct="1">
+            <a:pPr marL="0" marR="0" lvl="0" indent="0" algn="l" defTabSz="914400" rtl="0" eaLnBrk="1" fontAlgn="auto" latinLnBrk="1" hangingPunct="1">
               <a:lnSpc>
                 <a:spcPct val="100000"/>
               </a:lnSpc>
@@ -9756,7 +9858,7 @@
               <a:defRPr/>
             </a:pPr>
             <a:r>
-              <a:rPr kumimoji="0" lang="ko-KR" altLang="en-US" sz="2000" b="1" i="0" u="none" strike="noStrike" kern="1200" cap="none" spc="0" normalizeH="0" baseline="0" noProof="0" dirty="0">
+              <a:rPr kumimoji="0" lang="en-US" altLang="ko-KR" sz="1500" b="0" i="0" u="none" strike="noStrike" kern="1200" cap="none" spc="0" normalizeH="0" baseline="0" noProof="0" dirty="0">
                 <a:ln>
                   <a:noFill/>
                 </a:ln>
@@ -9773,34 +9875,17 @@
                 <a:ea typeface="아리따-돋움(TTF)-Medium" panose="02020603020101020101" pitchFamily="18" charset="-127"/>
                 <a:cs typeface="+mn-cs"/>
               </a:rPr>
-              <a:t>추적 결과</a:t>
-            </a:r>
-            <a:endParaRPr kumimoji="0" lang="en-US" altLang="ko-KR" sz="2000" b="1" i="0" u="none" strike="noStrike" kern="1200" cap="none" spc="0" normalizeH="0" baseline="0" noProof="0" dirty="0">
-              <a:ln>
-                <a:noFill/>
-              </a:ln>
-              <a:solidFill>
-                <a:prstClr val="black">
-                  <a:lumMod val="65000"/>
-                  <a:lumOff val="35000"/>
-                </a:prstClr>
-              </a:solidFill>
-              <a:effectLst/>
-              <a:uLnTx/>
-              <a:uFillTx/>
-              <a:latin typeface="아리따-돋움(TTF)-Medium" panose="02020603020101020101" pitchFamily="18" charset="-127"/>
-              <a:ea typeface="아리따-돋움(TTF)-Medium" panose="02020603020101020101" pitchFamily="18" charset="-127"/>
-              <a:cs typeface="+mn-cs"/>
-            </a:endParaRPr>
-          </a:p>
-        </p:txBody>
-      </p:sp>
-      <p:sp>
-        <p:nvSpPr>
-          <p:cNvPr id="10" name="타원 9">
+              <a:t>Result</a:t>
+            </a:r>
+          </a:p>
+        </p:txBody>
+      </p:sp>
+      <p:sp>
+        <p:nvSpPr>
+          <p:cNvPr id="19" name="직사각형 18">
             <a:extLst>
               <a:ext uri="{FF2B5EF4-FFF2-40B4-BE49-F238E27FC236}">
-                <a16:creationId xmlns:a16="http://schemas.microsoft.com/office/drawing/2014/main" id="{F3EB148D-9BD4-41B6-8574-2762ED9CB526}"/>
+                <a16:creationId xmlns:a16="http://schemas.microsoft.com/office/drawing/2014/main" id="{DD26EEAB-A9D9-428A-BAF3-361B451A2FF6}"/>
               </a:ext>
             </a:extLst>
           </p:cNvPr>
@@ -9809,1290 +9894,8 @@
         </p:nvSpPr>
         <p:spPr>
           <a:xfrm>
-            <a:off x="2469305" y="4107516"/>
-            <a:ext cx="291490" cy="291490"/>
-          </a:xfrm>
-          <a:prstGeom prst="ellipse">
-            <a:avLst/>
-          </a:prstGeom>
-          <a:solidFill>
-            <a:schemeClr val="tx1">
-              <a:lumMod val="85000"/>
-              <a:lumOff val="15000"/>
-            </a:schemeClr>
-          </a:solidFill>
-          <a:ln w="76200">
-            <a:solidFill>
-              <a:schemeClr val="accent1">
-                <a:lumMod val="75000"/>
-              </a:schemeClr>
-            </a:solidFill>
-          </a:ln>
-        </p:spPr>
-        <p:style>
-          <a:lnRef idx="2">
-            <a:schemeClr val="accent1">
-              <a:shade val="50000"/>
-            </a:schemeClr>
-          </a:lnRef>
-          <a:fillRef idx="1">
-            <a:schemeClr val="accent1"/>
-          </a:fillRef>
-          <a:effectRef idx="0">
-            <a:schemeClr val="accent1"/>
-          </a:effectRef>
-          <a:fontRef idx="minor">
-            <a:schemeClr val="lt1"/>
-          </a:fontRef>
-        </p:style>
-        <p:txBody>
-          <a:bodyPr rtlCol="0" anchor="ctr"/>
-          <a:lstStyle/>
-          <a:p>
-            <a:pPr algn="ctr"/>
-            <a:endParaRPr lang="ko-KR" altLang="en-US">
-              <a:solidFill>
-                <a:prstClr val="white"/>
-              </a:solidFill>
-            </a:endParaRPr>
-          </a:p>
-        </p:txBody>
-      </p:sp>
-      <p:sp>
-        <p:nvSpPr>
-          <p:cNvPr id="11" name="타원 10">
-            <a:extLst>
-              <a:ext uri="{FF2B5EF4-FFF2-40B4-BE49-F238E27FC236}">
-                <a16:creationId xmlns:a16="http://schemas.microsoft.com/office/drawing/2014/main" id="{207FE451-94F7-4465-BEDC-0E0C56C52662}"/>
-              </a:ext>
-            </a:extLst>
-          </p:cNvPr>
-          <p:cNvSpPr/>
-          <p:nvPr/>
-        </p:nvSpPr>
-        <p:spPr>
-          <a:xfrm>
-            <a:off x="3017793" y="3838405"/>
-            <a:ext cx="291490" cy="291490"/>
-          </a:xfrm>
-          <a:prstGeom prst="ellipse">
-            <a:avLst/>
-          </a:prstGeom>
-          <a:solidFill>
-            <a:schemeClr val="tx1">
-              <a:lumMod val="85000"/>
-              <a:lumOff val="15000"/>
-            </a:schemeClr>
-          </a:solidFill>
-          <a:ln w="76200">
-            <a:solidFill>
-              <a:schemeClr val="accent1">
-                <a:lumMod val="75000"/>
-              </a:schemeClr>
-            </a:solidFill>
-          </a:ln>
-        </p:spPr>
-        <p:style>
-          <a:lnRef idx="2">
-            <a:schemeClr val="accent1">
-              <a:shade val="50000"/>
-            </a:schemeClr>
-          </a:lnRef>
-          <a:fillRef idx="1">
-            <a:schemeClr val="accent1"/>
-          </a:fillRef>
-          <a:effectRef idx="0">
-            <a:schemeClr val="accent1"/>
-          </a:effectRef>
-          <a:fontRef idx="minor">
-            <a:schemeClr val="lt1"/>
-          </a:fontRef>
-        </p:style>
-        <p:txBody>
-          <a:bodyPr rtlCol="0" anchor="ctr"/>
-          <a:lstStyle/>
-          <a:p>
-            <a:pPr algn="ctr"/>
-            <a:endParaRPr lang="ko-KR" altLang="en-US">
-              <a:solidFill>
-                <a:prstClr val="white"/>
-              </a:solidFill>
-            </a:endParaRPr>
-          </a:p>
-        </p:txBody>
-      </p:sp>
-      <p:sp>
-        <p:nvSpPr>
-          <p:cNvPr id="14" name="타원 13">
-            <a:extLst>
-              <a:ext uri="{FF2B5EF4-FFF2-40B4-BE49-F238E27FC236}">
-                <a16:creationId xmlns:a16="http://schemas.microsoft.com/office/drawing/2014/main" id="{A6A6CD13-72C2-45C3-8431-0DD95F2CB47B}"/>
-              </a:ext>
-            </a:extLst>
-          </p:cNvPr>
-          <p:cNvSpPr/>
-          <p:nvPr/>
-        </p:nvSpPr>
-        <p:spPr>
-          <a:xfrm>
-            <a:off x="3589758" y="4081683"/>
-            <a:ext cx="291490" cy="291490"/>
-          </a:xfrm>
-          <a:prstGeom prst="ellipse">
-            <a:avLst/>
-          </a:prstGeom>
-          <a:solidFill>
-            <a:schemeClr val="tx1">
-              <a:lumMod val="85000"/>
-              <a:lumOff val="15000"/>
-            </a:schemeClr>
-          </a:solidFill>
-          <a:ln w="76200">
-            <a:solidFill>
-              <a:schemeClr val="accent1">
-                <a:lumMod val="75000"/>
-              </a:schemeClr>
-            </a:solidFill>
-          </a:ln>
-        </p:spPr>
-        <p:style>
-          <a:lnRef idx="2">
-            <a:schemeClr val="accent1">
-              <a:shade val="50000"/>
-            </a:schemeClr>
-          </a:lnRef>
-          <a:fillRef idx="1">
-            <a:schemeClr val="accent1"/>
-          </a:fillRef>
-          <a:effectRef idx="0">
-            <a:schemeClr val="accent1"/>
-          </a:effectRef>
-          <a:fontRef idx="minor">
-            <a:schemeClr val="lt1"/>
-          </a:fontRef>
-        </p:style>
-        <p:txBody>
-          <a:bodyPr rtlCol="0" anchor="ctr"/>
-          <a:lstStyle/>
-          <a:p>
-            <a:pPr algn="ctr"/>
-            <a:endParaRPr lang="ko-KR" altLang="en-US">
-              <a:solidFill>
-                <a:prstClr val="white"/>
-              </a:solidFill>
-            </a:endParaRPr>
-          </a:p>
-        </p:txBody>
-      </p:sp>
-      <p:sp>
-        <p:nvSpPr>
-          <p:cNvPr id="15" name="타원 14">
-            <a:extLst>
-              <a:ext uri="{FF2B5EF4-FFF2-40B4-BE49-F238E27FC236}">
-                <a16:creationId xmlns:a16="http://schemas.microsoft.com/office/drawing/2014/main" id="{F9ECAFB7-7B83-4247-BF7E-D6775643F8C1}"/>
-              </a:ext>
-            </a:extLst>
-          </p:cNvPr>
-          <p:cNvSpPr/>
-          <p:nvPr/>
-        </p:nvSpPr>
-        <p:spPr>
-          <a:xfrm>
-            <a:off x="2534662" y="4171822"/>
-            <a:ext cx="177281" cy="177281"/>
-          </a:xfrm>
-          <a:prstGeom prst="ellipse">
-            <a:avLst/>
-          </a:prstGeom>
-          <a:solidFill>
-            <a:schemeClr val="bg1">
-              <a:lumMod val="95000"/>
-            </a:schemeClr>
-          </a:solidFill>
-          <a:ln w="57150">
-            <a:solidFill>
-              <a:schemeClr val="accent1">
-                <a:lumMod val="75000"/>
-              </a:schemeClr>
-            </a:solidFill>
-          </a:ln>
-        </p:spPr>
-        <p:style>
-          <a:lnRef idx="2">
-            <a:schemeClr val="accent1">
-              <a:shade val="50000"/>
-            </a:schemeClr>
-          </a:lnRef>
-          <a:fillRef idx="1">
-            <a:schemeClr val="accent1"/>
-          </a:fillRef>
-          <a:effectRef idx="0">
-            <a:schemeClr val="accent1"/>
-          </a:effectRef>
-          <a:fontRef idx="minor">
-            <a:schemeClr val="lt1"/>
-          </a:fontRef>
-        </p:style>
-        <p:txBody>
-          <a:bodyPr rtlCol="0" anchor="ctr"/>
-          <a:lstStyle/>
-          <a:p>
-            <a:pPr algn="ctr"/>
-            <a:endParaRPr lang="ko-KR" altLang="en-US" dirty="0">
-              <a:solidFill>
-                <a:prstClr val="white"/>
-              </a:solidFill>
-            </a:endParaRPr>
-          </a:p>
-        </p:txBody>
-      </p:sp>
-      <p:sp>
-        <p:nvSpPr>
-          <p:cNvPr id="17" name="타원 16">
-            <a:extLst>
-              <a:ext uri="{FF2B5EF4-FFF2-40B4-BE49-F238E27FC236}">
-                <a16:creationId xmlns:a16="http://schemas.microsoft.com/office/drawing/2014/main" id="{500A237C-8E68-4B60-B601-01E42237F852}"/>
-              </a:ext>
-            </a:extLst>
-          </p:cNvPr>
-          <p:cNvSpPr/>
-          <p:nvPr/>
-        </p:nvSpPr>
-        <p:spPr>
-          <a:xfrm>
-            <a:off x="3074896" y="3895509"/>
-            <a:ext cx="177281" cy="177281"/>
-          </a:xfrm>
-          <a:prstGeom prst="ellipse">
-            <a:avLst/>
-          </a:prstGeom>
-          <a:solidFill>
-            <a:schemeClr val="bg1">
-              <a:lumMod val="95000"/>
-            </a:schemeClr>
-          </a:solidFill>
-          <a:ln w="57150">
-            <a:solidFill>
-              <a:schemeClr val="accent1">
-                <a:lumMod val="75000"/>
-              </a:schemeClr>
-            </a:solidFill>
-          </a:ln>
-        </p:spPr>
-        <p:style>
-          <a:lnRef idx="2">
-            <a:schemeClr val="accent1">
-              <a:shade val="50000"/>
-            </a:schemeClr>
-          </a:lnRef>
-          <a:fillRef idx="1">
-            <a:schemeClr val="accent1"/>
-          </a:fillRef>
-          <a:effectRef idx="0">
-            <a:schemeClr val="accent1"/>
-          </a:effectRef>
-          <a:fontRef idx="minor">
-            <a:schemeClr val="lt1"/>
-          </a:fontRef>
-        </p:style>
-        <p:txBody>
-          <a:bodyPr rtlCol="0" anchor="ctr"/>
-          <a:lstStyle/>
-          <a:p>
-            <a:pPr algn="ctr"/>
-            <a:endParaRPr lang="ko-KR" altLang="en-US">
-              <a:solidFill>
-                <a:prstClr val="white"/>
-              </a:solidFill>
-            </a:endParaRPr>
-          </a:p>
-        </p:txBody>
-      </p:sp>
-      <p:sp>
-        <p:nvSpPr>
-          <p:cNvPr id="19" name="타원 18">
-            <a:extLst>
-              <a:ext uri="{FF2B5EF4-FFF2-40B4-BE49-F238E27FC236}">
-                <a16:creationId xmlns:a16="http://schemas.microsoft.com/office/drawing/2014/main" id="{1445CAE6-C40B-4A50-A810-FA34C3D65FF6}"/>
-              </a:ext>
-            </a:extLst>
-          </p:cNvPr>
-          <p:cNvSpPr/>
-          <p:nvPr/>
-        </p:nvSpPr>
-        <p:spPr>
-          <a:xfrm>
-            <a:off x="3646862" y="4138787"/>
-            <a:ext cx="177281" cy="177281"/>
-          </a:xfrm>
-          <a:prstGeom prst="ellipse">
-            <a:avLst/>
-          </a:prstGeom>
-          <a:solidFill>
-            <a:schemeClr val="bg1">
-              <a:lumMod val="95000"/>
-            </a:schemeClr>
-          </a:solidFill>
-          <a:ln w="57150">
-            <a:solidFill>
-              <a:schemeClr val="accent1">
-                <a:lumMod val="75000"/>
-              </a:schemeClr>
-            </a:solidFill>
-          </a:ln>
-        </p:spPr>
-        <p:style>
-          <a:lnRef idx="2">
-            <a:schemeClr val="accent1">
-              <a:shade val="50000"/>
-            </a:schemeClr>
-          </a:lnRef>
-          <a:fillRef idx="1">
-            <a:schemeClr val="accent1"/>
-          </a:fillRef>
-          <a:effectRef idx="0">
-            <a:schemeClr val="accent1"/>
-          </a:effectRef>
-          <a:fontRef idx="minor">
-            <a:schemeClr val="lt1"/>
-          </a:fontRef>
-        </p:style>
-        <p:txBody>
-          <a:bodyPr rtlCol="0" anchor="ctr"/>
-          <a:lstStyle/>
-          <a:p>
-            <a:pPr algn="ctr"/>
-            <a:endParaRPr lang="ko-KR" altLang="en-US">
-              <a:solidFill>
-                <a:prstClr val="white"/>
-              </a:solidFill>
-            </a:endParaRPr>
-          </a:p>
-        </p:txBody>
-      </p:sp>
-      <p:sp>
-        <p:nvSpPr>
-          <p:cNvPr id="25" name="타원 24">
-            <a:extLst>
-              <a:ext uri="{FF2B5EF4-FFF2-40B4-BE49-F238E27FC236}">
-                <a16:creationId xmlns:a16="http://schemas.microsoft.com/office/drawing/2014/main" id="{3F78B6BC-E288-4366-97D2-8114EBA18706}"/>
-              </a:ext>
-            </a:extLst>
-          </p:cNvPr>
-          <p:cNvSpPr/>
-          <p:nvPr/>
-        </p:nvSpPr>
-        <p:spPr>
-          <a:xfrm>
-            <a:off x="5820100" y="4011505"/>
-            <a:ext cx="291490" cy="291490"/>
-          </a:xfrm>
-          <a:prstGeom prst="ellipse">
-            <a:avLst/>
-          </a:prstGeom>
-          <a:solidFill>
-            <a:schemeClr val="tx1">
-              <a:lumMod val="85000"/>
-              <a:lumOff val="15000"/>
-            </a:schemeClr>
-          </a:solidFill>
-          <a:ln w="76200">
-            <a:solidFill>
-              <a:schemeClr val="accent1">
-                <a:lumMod val="75000"/>
-              </a:schemeClr>
-            </a:solidFill>
-          </a:ln>
-        </p:spPr>
-        <p:style>
-          <a:lnRef idx="2">
-            <a:schemeClr val="accent1">
-              <a:shade val="50000"/>
-            </a:schemeClr>
-          </a:lnRef>
-          <a:fillRef idx="1">
-            <a:schemeClr val="accent1"/>
-          </a:fillRef>
-          <a:effectRef idx="0">
-            <a:schemeClr val="accent1"/>
-          </a:effectRef>
-          <a:fontRef idx="minor">
-            <a:schemeClr val="lt1"/>
-          </a:fontRef>
-        </p:style>
-        <p:txBody>
-          <a:bodyPr rtlCol="0" anchor="ctr"/>
-          <a:lstStyle/>
-          <a:p>
-            <a:pPr algn="ctr"/>
-            <a:endParaRPr lang="ko-KR" altLang="en-US">
-              <a:solidFill>
-                <a:prstClr val="white"/>
-              </a:solidFill>
-            </a:endParaRPr>
-          </a:p>
-        </p:txBody>
-      </p:sp>
-      <p:sp>
-        <p:nvSpPr>
-          <p:cNvPr id="26" name="타원 25">
-            <a:extLst>
-              <a:ext uri="{FF2B5EF4-FFF2-40B4-BE49-F238E27FC236}">
-                <a16:creationId xmlns:a16="http://schemas.microsoft.com/office/drawing/2014/main" id="{471DAA5F-7270-47DD-A857-BB4628ED06C6}"/>
-              </a:ext>
-            </a:extLst>
-          </p:cNvPr>
-          <p:cNvSpPr/>
-          <p:nvPr/>
-        </p:nvSpPr>
-        <p:spPr>
-          <a:xfrm>
-            <a:off x="6515736" y="3791200"/>
-            <a:ext cx="291490" cy="291490"/>
-          </a:xfrm>
-          <a:prstGeom prst="ellipse">
-            <a:avLst/>
-          </a:prstGeom>
-          <a:solidFill>
-            <a:schemeClr val="tx1">
-              <a:lumMod val="85000"/>
-              <a:lumOff val="15000"/>
-            </a:schemeClr>
-          </a:solidFill>
-          <a:ln w="76200">
-            <a:solidFill>
-              <a:schemeClr val="accent1">
-                <a:lumMod val="75000"/>
-              </a:schemeClr>
-            </a:solidFill>
-          </a:ln>
-        </p:spPr>
-        <p:style>
-          <a:lnRef idx="2">
-            <a:schemeClr val="accent1">
-              <a:shade val="50000"/>
-            </a:schemeClr>
-          </a:lnRef>
-          <a:fillRef idx="1">
-            <a:schemeClr val="accent1"/>
-          </a:fillRef>
-          <a:effectRef idx="0">
-            <a:schemeClr val="accent1"/>
-          </a:effectRef>
-          <a:fontRef idx="minor">
-            <a:schemeClr val="lt1"/>
-          </a:fontRef>
-        </p:style>
-        <p:txBody>
-          <a:bodyPr rtlCol="0" anchor="ctr"/>
-          <a:lstStyle/>
-          <a:p>
-            <a:pPr algn="ctr"/>
-            <a:endParaRPr lang="ko-KR" altLang="en-US">
-              <a:solidFill>
-                <a:prstClr val="white"/>
-              </a:solidFill>
-            </a:endParaRPr>
-          </a:p>
-        </p:txBody>
-      </p:sp>
-      <p:sp>
-        <p:nvSpPr>
-          <p:cNvPr id="27" name="타원 26">
-            <a:extLst>
-              <a:ext uri="{FF2B5EF4-FFF2-40B4-BE49-F238E27FC236}">
-                <a16:creationId xmlns:a16="http://schemas.microsoft.com/office/drawing/2014/main" id="{1DBEF6BA-6B79-4233-B8C5-FF7D4BB683A1}"/>
-              </a:ext>
-            </a:extLst>
-          </p:cNvPr>
-          <p:cNvSpPr/>
-          <p:nvPr/>
-        </p:nvSpPr>
-        <p:spPr>
-          <a:xfrm>
-            <a:off x="7192450" y="4001497"/>
-            <a:ext cx="291490" cy="291490"/>
-          </a:xfrm>
-          <a:prstGeom prst="ellipse">
-            <a:avLst/>
-          </a:prstGeom>
-          <a:solidFill>
-            <a:schemeClr val="tx1">
-              <a:lumMod val="85000"/>
-              <a:lumOff val="15000"/>
-            </a:schemeClr>
-          </a:solidFill>
-          <a:ln w="76200">
-            <a:solidFill>
-              <a:schemeClr val="accent1">
-                <a:lumMod val="75000"/>
-              </a:schemeClr>
-            </a:solidFill>
-          </a:ln>
-        </p:spPr>
-        <p:style>
-          <a:lnRef idx="2">
-            <a:schemeClr val="accent1">
-              <a:shade val="50000"/>
-            </a:schemeClr>
-          </a:lnRef>
-          <a:fillRef idx="1">
-            <a:schemeClr val="accent1"/>
-          </a:fillRef>
-          <a:effectRef idx="0">
-            <a:schemeClr val="accent1"/>
-          </a:effectRef>
-          <a:fontRef idx="minor">
-            <a:schemeClr val="lt1"/>
-          </a:fontRef>
-        </p:style>
-        <p:txBody>
-          <a:bodyPr rtlCol="0" anchor="ctr"/>
-          <a:lstStyle/>
-          <a:p>
-            <a:pPr algn="ctr"/>
-            <a:endParaRPr lang="ko-KR" altLang="en-US">
-              <a:solidFill>
-                <a:prstClr val="white"/>
-              </a:solidFill>
-            </a:endParaRPr>
-          </a:p>
-        </p:txBody>
-      </p:sp>
-      <p:sp>
-        <p:nvSpPr>
-          <p:cNvPr id="28" name="타원 27">
-            <a:extLst>
-              <a:ext uri="{FF2B5EF4-FFF2-40B4-BE49-F238E27FC236}">
-                <a16:creationId xmlns:a16="http://schemas.microsoft.com/office/drawing/2014/main" id="{499A255F-7D94-4908-A699-BCDD10D0560C}"/>
-              </a:ext>
-            </a:extLst>
-          </p:cNvPr>
-          <p:cNvSpPr/>
-          <p:nvPr/>
-        </p:nvSpPr>
-        <p:spPr>
-          <a:xfrm>
-            <a:off x="5876579" y="4066933"/>
-            <a:ext cx="177281" cy="177281"/>
-          </a:xfrm>
-          <a:prstGeom prst="ellipse">
-            <a:avLst/>
-          </a:prstGeom>
-          <a:solidFill>
-            <a:schemeClr val="bg1">
-              <a:lumMod val="95000"/>
-            </a:schemeClr>
-          </a:solidFill>
-          <a:ln w="57150">
-            <a:solidFill>
-              <a:schemeClr val="accent1">
-                <a:lumMod val="75000"/>
-              </a:schemeClr>
-            </a:solidFill>
-          </a:ln>
-        </p:spPr>
-        <p:style>
-          <a:lnRef idx="2">
-            <a:schemeClr val="accent1">
-              <a:shade val="50000"/>
-            </a:schemeClr>
-          </a:lnRef>
-          <a:fillRef idx="1">
-            <a:schemeClr val="accent1"/>
-          </a:fillRef>
-          <a:effectRef idx="0">
-            <a:schemeClr val="accent1"/>
-          </a:effectRef>
-          <a:fontRef idx="minor">
-            <a:schemeClr val="lt1"/>
-          </a:fontRef>
-        </p:style>
-        <p:txBody>
-          <a:bodyPr rtlCol="0" anchor="ctr"/>
-          <a:lstStyle/>
-          <a:p>
-            <a:pPr algn="ctr"/>
-            <a:endParaRPr lang="ko-KR" altLang="en-US" dirty="0">
-              <a:solidFill>
-                <a:prstClr val="white"/>
-              </a:solidFill>
-            </a:endParaRPr>
-          </a:p>
-        </p:txBody>
-      </p:sp>
-      <p:sp>
-        <p:nvSpPr>
-          <p:cNvPr id="29" name="타원 28">
-            <a:extLst>
-              <a:ext uri="{FF2B5EF4-FFF2-40B4-BE49-F238E27FC236}">
-                <a16:creationId xmlns:a16="http://schemas.microsoft.com/office/drawing/2014/main" id="{F6F725CF-D06D-469C-9213-E99C03BF34C7}"/>
-              </a:ext>
-            </a:extLst>
-          </p:cNvPr>
-          <p:cNvSpPr/>
-          <p:nvPr/>
-        </p:nvSpPr>
-        <p:spPr>
-          <a:xfrm>
-            <a:off x="6572839" y="3848304"/>
-            <a:ext cx="177281" cy="177281"/>
-          </a:xfrm>
-          <a:prstGeom prst="ellipse">
-            <a:avLst/>
-          </a:prstGeom>
-          <a:solidFill>
-            <a:schemeClr val="bg1">
-              <a:lumMod val="95000"/>
-            </a:schemeClr>
-          </a:solidFill>
-          <a:ln w="57150">
-            <a:solidFill>
-              <a:schemeClr val="accent1">
-                <a:lumMod val="75000"/>
-              </a:schemeClr>
-            </a:solidFill>
-          </a:ln>
-        </p:spPr>
-        <p:style>
-          <a:lnRef idx="2">
-            <a:schemeClr val="accent1">
-              <a:shade val="50000"/>
-            </a:schemeClr>
-          </a:lnRef>
-          <a:fillRef idx="1">
-            <a:schemeClr val="accent1"/>
-          </a:fillRef>
-          <a:effectRef idx="0">
-            <a:schemeClr val="accent1"/>
-          </a:effectRef>
-          <a:fontRef idx="minor">
-            <a:schemeClr val="lt1"/>
-          </a:fontRef>
-        </p:style>
-        <p:txBody>
-          <a:bodyPr rtlCol="0" anchor="ctr"/>
-          <a:lstStyle/>
-          <a:p>
-            <a:pPr algn="ctr"/>
-            <a:endParaRPr lang="ko-KR" altLang="en-US">
-              <a:solidFill>
-                <a:prstClr val="white"/>
-              </a:solidFill>
-            </a:endParaRPr>
-          </a:p>
-        </p:txBody>
-      </p:sp>
-      <p:sp>
-        <p:nvSpPr>
-          <p:cNvPr id="30" name="타원 29">
-            <a:extLst>
-              <a:ext uri="{FF2B5EF4-FFF2-40B4-BE49-F238E27FC236}">
-                <a16:creationId xmlns:a16="http://schemas.microsoft.com/office/drawing/2014/main" id="{7FD3846A-786E-4BCA-9617-8F32A81C48D2}"/>
-              </a:ext>
-            </a:extLst>
-          </p:cNvPr>
-          <p:cNvSpPr/>
-          <p:nvPr/>
-        </p:nvSpPr>
-        <p:spPr>
-          <a:xfrm>
-            <a:off x="7249554" y="4058601"/>
-            <a:ext cx="177281" cy="177281"/>
-          </a:xfrm>
-          <a:prstGeom prst="ellipse">
-            <a:avLst/>
-          </a:prstGeom>
-          <a:solidFill>
-            <a:schemeClr val="bg1">
-              <a:lumMod val="95000"/>
-            </a:schemeClr>
-          </a:solidFill>
-          <a:ln w="57150">
-            <a:solidFill>
-              <a:schemeClr val="accent1">
-                <a:lumMod val="75000"/>
-              </a:schemeClr>
-            </a:solidFill>
-          </a:ln>
-        </p:spPr>
-        <p:style>
-          <a:lnRef idx="2">
-            <a:schemeClr val="accent1">
-              <a:shade val="50000"/>
-            </a:schemeClr>
-          </a:lnRef>
-          <a:fillRef idx="1">
-            <a:schemeClr val="accent1"/>
-          </a:fillRef>
-          <a:effectRef idx="0">
-            <a:schemeClr val="accent1"/>
-          </a:effectRef>
-          <a:fontRef idx="minor">
-            <a:schemeClr val="lt1"/>
-          </a:fontRef>
-        </p:style>
-        <p:txBody>
-          <a:bodyPr rtlCol="0" anchor="ctr"/>
-          <a:lstStyle/>
-          <a:p>
-            <a:pPr algn="ctr"/>
-            <a:endParaRPr lang="ko-KR" altLang="en-US">
-              <a:solidFill>
-                <a:prstClr val="white"/>
-              </a:solidFill>
-            </a:endParaRPr>
-          </a:p>
-        </p:txBody>
-      </p:sp>
-      <p:cxnSp>
-        <p:nvCxnSpPr>
-          <p:cNvPr id="34" name="직선 연결선 33">
-            <a:extLst>
-              <a:ext uri="{FF2B5EF4-FFF2-40B4-BE49-F238E27FC236}">
-                <a16:creationId xmlns:a16="http://schemas.microsoft.com/office/drawing/2014/main" id="{51C7BBD1-375B-49BA-A0BD-2214F2BA52B3}"/>
-              </a:ext>
-            </a:extLst>
-          </p:cNvPr>
-          <p:cNvCxnSpPr>
-            <a:cxnSpLocks/>
-            <a:stCxn id="52" idx="1"/>
-            <a:endCxn id="49" idx="6"/>
-          </p:cNvCxnSpPr>
-          <p:nvPr/>
-        </p:nvCxnSpPr>
-        <p:spPr>
-          <a:xfrm flipH="1" flipV="1">
-            <a:off x="4444798" y="3978293"/>
-            <a:ext cx="343197" cy="186456"/>
-          </a:xfrm>
-          <a:prstGeom prst="line">
-            <a:avLst/>
-          </a:prstGeom>
-          <a:ln w="38100">
-            <a:solidFill>
-              <a:schemeClr val="accent1">
-                <a:lumMod val="75000"/>
-              </a:schemeClr>
-            </a:solidFill>
-          </a:ln>
-        </p:spPr>
-        <p:style>
-          <a:lnRef idx="1">
-            <a:schemeClr val="accent1"/>
-          </a:lnRef>
-          <a:fillRef idx="0">
-            <a:schemeClr val="accent1"/>
-          </a:fillRef>
-          <a:effectRef idx="0">
-            <a:schemeClr val="accent1"/>
-          </a:effectRef>
-          <a:fontRef idx="minor">
-            <a:schemeClr val="tx1"/>
-          </a:fontRef>
-        </p:style>
-      </p:cxnSp>
-      <p:sp>
-        <p:nvSpPr>
-          <p:cNvPr id="49" name="타원 48">
-            <a:extLst>
-              <a:ext uri="{FF2B5EF4-FFF2-40B4-BE49-F238E27FC236}">
-                <a16:creationId xmlns:a16="http://schemas.microsoft.com/office/drawing/2014/main" id="{C98AE206-A76C-49AE-BD34-68D9AE8804A0}"/>
-              </a:ext>
-            </a:extLst>
-          </p:cNvPr>
-          <p:cNvSpPr/>
-          <p:nvPr/>
-        </p:nvSpPr>
-        <p:spPr>
-          <a:xfrm>
-            <a:off x="4153308" y="3832548"/>
-            <a:ext cx="291490" cy="291490"/>
-          </a:xfrm>
-          <a:prstGeom prst="ellipse">
-            <a:avLst/>
-          </a:prstGeom>
-          <a:solidFill>
-            <a:schemeClr val="tx1">
-              <a:lumMod val="85000"/>
-              <a:lumOff val="15000"/>
-            </a:schemeClr>
-          </a:solidFill>
-          <a:ln w="76200">
-            <a:solidFill>
-              <a:schemeClr val="accent1">
-                <a:lumMod val="75000"/>
-              </a:schemeClr>
-            </a:solidFill>
-          </a:ln>
-        </p:spPr>
-        <p:style>
-          <a:lnRef idx="2">
-            <a:schemeClr val="accent1">
-              <a:shade val="50000"/>
-            </a:schemeClr>
-          </a:lnRef>
-          <a:fillRef idx="1">
-            <a:schemeClr val="accent1"/>
-          </a:fillRef>
-          <a:effectRef idx="0">
-            <a:schemeClr val="accent1"/>
-          </a:effectRef>
-          <a:fontRef idx="minor">
-            <a:schemeClr val="lt1"/>
-          </a:fontRef>
-        </p:style>
-        <p:txBody>
-          <a:bodyPr rtlCol="0" anchor="ctr"/>
-          <a:lstStyle/>
-          <a:p>
-            <a:pPr algn="ctr"/>
-            <a:endParaRPr lang="ko-KR" altLang="en-US">
-              <a:solidFill>
-                <a:prstClr val="white"/>
-              </a:solidFill>
-            </a:endParaRPr>
-          </a:p>
-        </p:txBody>
-      </p:sp>
-      <p:sp>
-        <p:nvSpPr>
-          <p:cNvPr id="50" name="타원 49">
-            <a:extLst>
-              <a:ext uri="{FF2B5EF4-FFF2-40B4-BE49-F238E27FC236}">
-                <a16:creationId xmlns:a16="http://schemas.microsoft.com/office/drawing/2014/main" id="{BAB391D1-FC22-4C14-B6A8-DC1532650433}"/>
-              </a:ext>
-            </a:extLst>
-          </p:cNvPr>
-          <p:cNvSpPr/>
-          <p:nvPr/>
-        </p:nvSpPr>
-        <p:spPr>
-          <a:xfrm>
-            <a:off x="4210412" y="3889652"/>
-            <a:ext cx="177281" cy="177281"/>
-          </a:xfrm>
-          <a:prstGeom prst="ellipse">
-            <a:avLst/>
-          </a:prstGeom>
-          <a:solidFill>
-            <a:schemeClr val="bg1">
-              <a:lumMod val="95000"/>
-            </a:schemeClr>
-          </a:solidFill>
-          <a:ln w="57150">
-            <a:solidFill>
-              <a:schemeClr val="accent1">
-                <a:lumMod val="75000"/>
-              </a:schemeClr>
-            </a:solidFill>
-          </a:ln>
-        </p:spPr>
-        <p:style>
-          <a:lnRef idx="2">
-            <a:schemeClr val="accent1">
-              <a:shade val="50000"/>
-            </a:schemeClr>
-          </a:lnRef>
-          <a:fillRef idx="1">
-            <a:schemeClr val="accent1"/>
-          </a:fillRef>
-          <a:effectRef idx="0">
-            <a:schemeClr val="accent1"/>
-          </a:effectRef>
-          <a:fontRef idx="minor">
-            <a:schemeClr val="lt1"/>
-          </a:fontRef>
-        </p:style>
-        <p:txBody>
-          <a:bodyPr rtlCol="0" anchor="ctr"/>
-          <a:lstStyle/>
-          <a:p>
-            <a:pPr algn="ctr"/>
-            <a:endParaRPr lang="ko-KR" altLang="en-US">
-              <a:solidFill>
-                <a:prstClr val="white"/>
-              </a:solidFill>
-            </a:endParaRPr>
-          </a:p>
-        </p:txBody>
-      </p:sp>
-      <p:sp>
-        <p:nvSpPr>
-          <p:cNvPr id="51" name="타원 50">
-            <a:extLst>
-              <a:ext uri="{FF2B5EF4-FFF2-40B4-BE49-F238E27FC236}">
-                <a16:creationId xmlns:a16="http://schemas.microsoft.com/office/drawing/2014/main" id="{B41761FB-9367-4737-A8D2-586F994862CD}"/>
-              </a:ext>
-            </a:extLst>
-          </p:cNvPr>
-          <p:cNvSpPr/>
-          <p:nvPr/>
-        </p:nvSpPr>
-        <p:spPr>
-          <a:xfrm>
-            <a:off x="4704929" y="4081683"/>
-            <a:ext cx="291490" cy="291490"/>
-          </a:xfrm>
-          <a:prstGeom prst="ellipse">
-            <a:avLst/>
-          </a:prstGeom>
-          <a:solidFill>
-            <a:schemeClr val="tx1">
-              <a:lumMod val="85000"/>
-              <a:lumOff val="15000"/>
-            </a:schemeClr>
-          </a:solidFill>
-          <a:ln w="76200">
-            <a:solidFill>
-              <a:schemeClr val="accent1">
-                <a:lumMod val="75000"/>
-              </a:schemeClr>
-            </a:solidFill>
-          </a:ln>
-        </p:spPr>
-        <p:style>
-          <a:lnRef idx="2">
-            <a:schemeClr val="accent1">
-              <a:shade val="50000"/>
-            </a:schemeClr>
-          </a:lnRef>
-          <a:fillRef idx="1">
-            <a:schemeClr val="accent1"/>
-          </a:fillRef>
-          <a:effectRef idx="0">
-            <a:schemeClr val="accent1"/>
-          </a:effectRef>
-          <a:fontRef idx="minor">
-            <a:schemeClr val="lt1"/>
-          </a:fontRef>
-        </p:style>
-        <p:txBody>
-          <a:bodyPr rtlCol="0" anchor="ctr"/>
-          <a:lstStyle/>
-          <a:p>
-            <a:pPr algn="ctr"/>
-            <a:endParaRPr lang="ko-KR" altLang="en-US">
-              <a:solidFill>
-                <a:prstClr val="white"/>
-              </a:solidFill>
-            </a:endParaRPr>
-          </a:p>
-        </p:txBody>
-      </p:sp>
-      <p:sp>
-        <p:nvSpPr>
-          <p:cNvPr id="52" name="타원 51">
-            <a:extLst>
-              <a:ext uri="{FF2B5EF4-FFF2-40B4-BE49-F238E27FC236}">
-                <a16:creationId xmlns:a16="http://schemas.microsoft.com/office/drawing/2014/main" id="{6D761FED-F71C-41AC-8922-55A394A7E0D5}"/>
-              </a:ext>
-            </a:extLst>
-          </p:cNvPr>
-          <p:cNvSpPr/>
-          <p:nvPr/>
-        </p:nvSpPr>
-        <p:spPr>
-          <a:xfrm>
-            <a:off x="4762033" y="4138787"/>
-            <a:ext cx="177281" cy="177281"/>
-          </a:xfrm>
-          <a:prstGeom prst="ellipse">
-            <a:avLst/>
-          </a:prstGeom>
-          <a:solidFill>
-            <a:schemeClr val="bg1">
-              <a:lumMod val="95000"/>
-            </a:schemeClr>
-          </a:solidFill>
-          <a:ln w="57150">
-            <a:solidFill>
-              <a:schemeClr val="accent1">
-                <a:lumMod val="75000"/>
-              </a:schemeClr>
-            </a:solidFill>
-          </a:ln>
-        </p:spPr>
-        <p:style>
-          <a:lnRef idx="2">
-            <a:schemeClr val="accent1">
-              <a:shade val="50000"/>
-            </a:schemeClr>
-          </a:lnRef>
-          <a:fillRef idx="1">
-            <a:schemeClr val="accent1"/>
-          </a:fillRef>
-          <a:effectRef idx="0">
-            <a:schemeClr val="accent1"/>
-          </a:effectRef>
-          <a:fontRef idx="minor">
-            <a:schemeClr val="lt1"/>
-          </a:fontRef>
-        </p:style>
-        <p:txBody>
-          <a:bodyPr rtlCol="0" anchor="ctr"/>
-          <a:lstStyle/>
-          <a:p>
-            <a:pPr algn="ctr"/>
-            <a:endParaRPr lang="ko-KR" altLang="en-US">
-              <a:solidFill>
-                <a:prstClr val="white"/>
-              </a:solidFill>
-            </a:endParaRPr>
-          </a:p>
-        </p:txBody>
-      </p:sp>
-      <p:cxnSp>
-        <p:nvCxnSpPr>
-          <p:cNvPr id="53" name="직선 연결선 52">
-            <a:extLst>
-              <a:ext uri="{FF2B5EF4-FFF2-40B4-BE49-F238E27FC236}">
-                <a16:creationId xmlns:a16="http://schemas.microsoft.com/office/drawing/2014/main" id="{4E741F69-0061-4655-8A79-43C7E7D20402}"/>
-              </a:ext>
-            </a:extLst>
-          </p:cNvPr>
-          <p:cNvCxnSpPr>
-            <a:cxnSpLocks/>
-            <a:stCxn id="27" idx="2"/>
-            <a:endCxn id="26" idx="6"/>
-          </p:cNvCxnSpPr>
-          <p:nvPr/>
-        </p:nvCxnSpPr>
-        <p:spPr>
-          <a:xfrm flipH="1" flipV="1">
-            <a:off x="6807226" y="3936945"/>
-            <a:ext cx="385224" cy="210297"/>
-          </a:xfrm>
-          <a:prstGeom prst="line">
-            <a:avLst/>
-          </a:prstGeom>
-          <a:ln w="38100">
-            <a:solidFill>
-              <a:schemeClr val="accent1">
-                <a:lumMod val="75000"/>
-              </a:schemeClr>
-            </a:solidFill>
-          </a:ln>
-        </p:spPr>
-        <p:style>
-          <a:lnRef idx="1">
-            <a:schemeClr val="accent1"/>
-          </a:lnRef>
-          <a:fillRef idx="0">
-            <a:schemeClr val="accent1"/>
-          </a:fillRef>
-          <a:effectRef idx="0">
-            <a:schemeClr val="accent1"/>
-          </a:effectRef>
-          <a:fontRef idx="minor">
-            <a:schemeClr val="tx1"/>
-          </a:fontRef>
-        </p:style>
-      </p:cxnSp>
-      <p:cxnSp>
-        <p:nvCxnSpPr>
-          <p:cNvPr id="56" name="직선 연결선 55">
-            <a:extLst>
-              <a:ext uri="{FF2B5EF4-FFF2-40B4-BE49-F238E27FC236}">
-                <a16:creationId xmlns:a16="http://schemas.microsoft.com/office/drawing/2014/main" id="{D6664432-0B0A-4CA9-B01A-414F6E26FDD3}"/>
-              </a:ext>
-            </a:extLst>
-          </p:cNvPr>
-          <p:cNvCxnSpPr>
-            <a:cxnSpLocks/>
-            <a:stCxn id="14" idx="6"/>
-            <a:endCxn id="49" idx="2"/>
-          </p:cNvCxnSpPr>
-          <p:nvPr/>
-        </p:nvCxnSpPr>
-        <p:spPr>
-          <a:xfrm flipV="1">
-            <a:off x="3881248" y="3978293"/>
-            <a:ext cx="272060" cy="249135"/>
-          </a:xfrm>
-          <a:prstGeom prst="line">
-            <a:avLst/>
-          </a:prstGeom>
-          <a:ln w="38100">
-            <a:solidFill>
-              <a:schemeClr val="accent1">
-                <a:lumMod val="75000"/>
-              </a:schemeClr>
-            </a:solidFill>
-          </a:ln>
-        </p:spPr>
-        <p:style>
-          <a:lnRef idx="1">
-            <a:schemeClr val="accent1"/>
-          </a:lnRef>
-          <a:fillRef idx="0">
-            <a:schemeClr val="accent1"/>
-          </a:fillRef>
-          <a:effectRef idx="0">
-            <a:schemeClr val="accent1"/>
-          </a:effectRef>
-          <a:fontRef idx="minor">
-            <a:schemeClr val="tx1"/>
-          </a:fontRef>
-        </p:style>
-      </p:cxnSp>
-      <p:cxnSp>
-        <p:nvCxnSpPr>
-          <p:cNvPr id="59" name="직선 연결선 58">
-            <a:extLst>
-              <a:ext uri="{FF2B5EF4-FFF2-40B4-BE49-F238E27FC236}">
-                <a16:creationId xmlns:a16="http://schemas.microsoft.com/office/drawing/2014/main" id="{38C9212C-BF44-4188-82D1-23832FD7761B}"/>
-              </a:ext>
-            </a:extLst>
-          </p:cNvPr>
-          <p:cNvCxnSpPr>
-            <a:cxnSpLocks/>
-            <a:stCxn id="14" idx="2"/>
-            <a:endCxn id="11" idx="6"/>
-          </p:cNvCxnSpPr>
-          <p:nvPr/>
-        </p:nvCxnSpPr>
-        <p:spPr>
-          <a:xfrm flipH="1" flipV="1">
-            <a:off x="3309283" y="3984150"/>
-            <a:ext cx="280475" cy="243278"/>
-          </a:xfrm>
-          <a:prstGeom prst="line">
-            <a:avLst/>
-          </a:prstGeom>
-          <a:ln w="38100">
-            <a:solidFill>
-              <a:schemeClr val="accent1">
-                <a:lumMod val="75000"/>
-              </a:schemeClr>
-            </a:solidFill>
-          </a:ln>
-        </p:spPr>
-        <p:style>
-          <a:lnRef idx="1">
-            <a:schemeClr val="accent1"/>
-          </a:lnRef>
-          <a:fillRef idx="0">
-            <a:schemeClr val="accent1"/>
-          </a:fillRef>
-          <a:effectRef idx="0">
-            <a:schemeClr val="accent1"/>
-          </a:effectRef>
-          <a:fontRef idx="minor">
-            <a:schemeClr val="tx1"/>
-          </a:fontRef>
-        </p:style>
-      </p:cxnSp>
-      <p:cxnSp>
-        <p:nvCxnSpPr>
-          <p:cNvPr id="62" name="직선 연결선 61">
-            <a:extLst>
-              <a:ext uri="{FF2B5EF4-FFF2-40B4-BE49-F238E27FC236}">
-                <a16:creationId xmlns:a16="http://schemas.microsoft.com/office/drawing/2014/main" id="{9238767E-107D-443B-A824-CA650F63CF09}"/>
-              </a:ext>
-            </a:extLst>
-          </p:cNvPr>
-          <p:cNvCxnSpPr>
-            <a:cxnSpLocks/>
-            <a:stCxn id="10" idx="6"/>
-            <a:endCxn id="11" idx="2"/>
-          </p:cNvCxnSpPr>
-          <p:nvPr/>
-        </p:nvCxnSpPr>
-        <p:spPr>
-          <a:xfrm flipV="1">
-            <a:off x="2760795" y="3984150"/>
-            <a:ext cx="256998" cy="269111"/>
-          </a:xfrm>
-          <a:prstGeom prst="line">
-            <a:avLst/>
-          </a:prstGeom>
-          <a:ln w="38100">
-            <a:solidFill>
-              <a:schemeClr val="accent1">
-                <a:lumMod val="75000"/>
-              </a:schemeClr>
-            </a:solidFill>
-          </a:ln>
-        </p:spPr>
-        <p:style>
-          <a:lnRef idx="1">
-            <a:schemeClr val="accent1"/>
-          </a:lnRef>
-          <a:fillRef idx="0">
-            <a:schemeClr val="accent1"/>
-          </a:fillRef>
-          <a:effectRef idx="0">
-            <a:schemeClr val="accent1"/>
-          </a:effectRef>
-          <a:fontRef idx="minor">
-            <a:schemeClr val="tx1"/>
-          </a:fontRef>
-        </p:style>
-      </p:cxnSp>
-      <p:cxnSp>
-        <p:nvCxnSpPr>
-          <p:cNvPr id="67" name="직선 연결선 66">
-            <a:extLst>
-              <a:ext uri="{FF2B5EF4-FFF2-40B4-BE49-F238E27FC236}">
-                <a16:creationId xmlns:a16="http://schemas.microsoft.com/office/drawing/2014/main" id="{F33E5833-85D3-414E-A121-52C9A2CA152F}"/>
-              </a:ext>
-            </a:extLst>
-          </p:cNvPr>
-          <p:cNvCxnSpPr>
-            <a:cxnSpLocks/>
-            <a:stCxn id="25" idx="6"/>
-            <a:endCxn id="26" idx="2"/>
-          </p:cNvCxnSpPr>
-          <p:nvPr/>
-        </p:nvCxnSpPr>
-        <p:spPr>
-          <a:xfrm flipV="1">
-            <a:off x="6111590" y="3936945"/>
-            <a:ext cx="404146" cy="220305"/>
-          </a:xfrm>
-          <a:prstGeom prst="line">
-            <a:avLst/>
-          </a:prstGeom>
-          <a:ln w="38100">
-            <a:solidFill>
-              <a:schemeClr val="accent1">
-                <a:lumMod val="75000"/>
-              </a:schemeClr>
-            </a:solidFill>
-          </a:ln>
-        </p:spPr>
-        <p:style>
-          <a:lnRef idx="1">
-            <a:schemeClr val="accent1"/>
-          </a:lnRef>
-          <a:fillRef idx="0">
-            <a:schemeClr val="accent1"/>
-          </a:fillRef>
-          <a:effectRef idx="0">
-            <a:schemeClr val="accent1"/>
-          </a:effectRef>
-          <a:fontRef idx="minor">
-            <a:schemeClr val="tx1"/>
-          </a:fontRef>
-        </p:style>
-      </p:cxnSp>
-      <p:sp>
-        <p:nvSpPr>
-          <p:cNvPr id="70" name="직사각형 69">
-            <a:extLst>
-              <a:ext uri="{FF2B5EF4-FFF2-40B4-BE49-F238E27FC236}">
-                <a16:creationId xmlns:a16="http://schemas.microsoft.com/office/drawing/2014/main" id="{B7E6E8B0-8F79-40D5-93CD-DD05110D1150}"/>
-              </a:ext>
-            </a:extLst>
-          </p:cNvPr>
-          <p:cNvSpPr/>
-          <p:nvPr/>
-        </p:nvSpPr>
-        <p:spPr>
-          <a:xfrm>
-            <a:off x="3453348" y="4557282"/>
-            <a:ext cx="2860315" cy="333617"/>
+            <a:off x="1077771" y="3644314"/>
+            <a:ext cx="3197877" cy="1030603"/>
           </a:xfrm>
           <a:prstGeom prst="rect">
             <a:avLst/>
@@ -11112,19 +9915,45 @@
               <a:defRPr/>
             </a:pPr>
             <a:r>
-              <a:rPr lang="ko-KR" altLang="en-US" sz="1200">
-                <a:solidFill>
-                  <a:prstClr val="black">
-                    <a:lumMod val="85000"/>
-                    <a:lumOff val="15000"/>
-                  </a:prstClr>
-                </a:solidFill>
-                <a:latin typeface="아리따-돋움(TTF)-Bold" panose="02020603020101020101" pitchFamily="18" charset="-127"/>
-                <a:ea typeface="아리따-돋움(TTF)-Bold" panose="02020603020101020101" pitchFamily="18" charset="-127"/>
-              </a:rPr>
-              <a:t>장거리</a:t>
-            </a:r>
-            <a:endParaRPr lang="en-US" altLang="ko-KR" sz="1200" dirty="0">
+              <a:rPr lang="ko-KR" altLang="en-US" sz="1050" dirty="0">
+                <a:solidFill>
+                  <a:prstClr val="black">
+                    <a:lumMod val="85000"/>
+                    <a:lumOff val="15000"/>
+                  </a:prstClr>
+                </a:solidFill>
+                <a:latin typeface="아리따-돋움(TTF)-Bold" panose="02020603020101020101" pitchFamily="18" charset="-127"/>
+                <a:ea typeface="아리따-돋움(TTF)-Bold" panose="02020603020101020101" pitchFamily="18" charset="-127"/>
+              </a:rPr>
+              <a:t>패킷 캡쳐를 통해 연결형 </a:t>
+            </a:r>
+            <a:r>
+              <a:rPr lang="en-US" altLang="ko-KR" sz="1050" dirty="0">
+                <a:solidFill>
+                  <a:prstClr val="black">
+                    <a:lumMod val="85000"/>
+                    <a:lumOff val="15000"/>
+                  </a:prstClr>
+                </a:solidFill>
+                <a:latin typeface="아리따-돋움(TTF)-Bold" panose="02020603020101020101" pitchFamily="18" charset="-127"/>
+                <a:ea typeface="아리따-돋움(TTF)-Bold" panose="02020603020101020101" pitchFamily="18" charset="-127"/>
+              </a:rPr>
+              <a:t>TCP</a:t>
+            </a:r>
+            <a:r>
+              <a:rPr lang="ko-KR" altLang="en-US" sz="1050" dirty="0">
+                <a:solidFill>
+                  <a:prstClr val="black">
+                    <a:lumMod val="85000"/>
+                    <a:lumOff val="15000"/>
+                  </a:prstClr>
+                </a:solidFill>
+                <a:latin typeface="아리따-돋움(TTF)-Bold" panose="02020603020101020101" pitchFamily="18" charset="-127"/>
+                <a:ea typeface="아리따-돋움(TTF)-Bold" panose="02020603020101020101" pitchFamily="18" charset="-127"/>
+              </a:rPr>
+              <a:t>통신을 통해</a:t>
+            </a:r>
+            <a:endParaRPr lang="en-US" altLang="ko-KR" sz="1050" dirty="0">
               <a:solidFill>
                 <a:prstClr val="black">
                   <a:lumMod val="85000"/>
@@ -11135,35 +9964,6 @@
               <a:ea typeface="아리따-돋움(TTF)-Bold" panose="02020603020101020101" pitchFamily="18" charset="-127"/>
             </a:endParaRPr>
           </a:p>
-        </p:txBody>
-      </p:sp>
-      <p:sp>
-        <p:nvSpPr>
-          <p:cNvPr id="71" name="직사각형 70">
-            <a:extLst>
-              <a:ext uri="{FF2B5EF4-FFF2-40B4-BE49-F238E27FC236}">
-                <a16:creationId xmlns:a16="http://schemas.microsoft.com/office/drawing/2014/main" id="{7460FAC6-669B-4AB0-89D5-AE4A408331F0}"/>
-              </a:ext>
-            </a:extLst>
-          </p:cNvPr>
-          <p:cNvSpPr/>
-          <p:nvPr/>
-        </p:nvSpPr>
-        <p:spPr>
-          <a:xfrm>
-            <a:off x="6515736" y="4557282"/>
-            <a:ext cx="2860315" cy="333617"/>
-          </a:xfrm>
-          <a:prstGeom prst="rect">
-            <a:avLst/>
-          </a:prstGeom>
-          <a:noFill/>
-        </p:spPr>
-        <p:txBody>
-          <a:bodyPr wrap="square">
-            <a:spAutoFit/>
-          </a:bodyPr>
-          <a:lstStyle/>
           <a:p>
             <a:pPr lvl="0">
               <a:lnSpc>
@@ -11172,19 +9972,58 @@
               <a:defRPr/>
             </a:pPr>
             <a:r>
-              <a:rPr lang="ko-KR" altLang="en-US" sz="1200" dirty="0">
-                <a:solidFill>
-                  <a:prstClr val="black">
-                    <a:lumMod val="85000"/>
-                    <a:lumOff val="15000"/>
-                  </a:prstClr>
-                </a:solidFill>
-                <a:latin typeface="아리따-돋움(TTF)-Bold" panose="02020603020101020101" pitchFamily="18" charset="-127"/>
-                <a:ea typeface="아리따-돋움(TTF)-Bold" panose="02020603020101020101" pitchFamily="18" charset="-127"/>
-              </a:rPr>
-              <a:t>단거리</a:t>
-            </a:r>
-            <a:endParaRPr lang="en-US" altLang="ko-KR" sz="1200" dirty="0">
+              <a:rPr lang="en-US" altLang="ko-KR" sz="1050" dirty="0">
+                <a:solidFill>
+                  <a:prstClr val="black">
+                    <a:lumMod val="85000"/>
+                    <a:lumOff val="15000"/>
+                  </a:prstClr>
+                </a:solidFill>
+                <a:latin typeface="아리따-돋움(TTF)-Bold" panose="02020603020101020101" pitchFamily="18" charset="-127"/>
+                <a:ea typeface="아리따-돋움(TTF)-Bold" panose="02020603020101020101" pitchFamily="18" charset="-127"/>
+              </a:rPr>
+              <a:t>127.0.0.1, </a:t>
+            </a:r>
+            <a:r>
+              <a:rPr lang="ko-KR" altLang="en-US" sz="1050" dirty="0">
+                <a:solidFill>
+                  <a:prstClr val="black">
+                    <a:lumMod val="85000"/>
+                    <a:lumOff val="15000"/>
+                  </a:prstClr>
+                </a:solidFill>
+                <a:latin typeface="아리따-돋움(TTF)-Bold" panose="02020603020101020101" pitchFamily="18" charset="-127"/>
+                <a:ea typeface="아리따-돋움(TTF)-Bold" panose="02020603020101020101" pitchFamily="18" charset="-127"/>
+              </a:rPr>
+              <a:t>루프백을 통해 </a:t>
+            </a:r>
+            <a:r>
+              <a:rPr lang="en-US" altLang="ko-KR" sz="1050" dirty="0">
+                <a:solidFill>
+                  <a:prstClr val="black">
+                    <a:lumMod val="85000"/>
+                    <a:lumOff val="15000"/>
+                  </a:prstClr>
+                </a:solidFill>
+                <a:latin typeface="아리따-돋움(TTF)-Bold" panose="02020603020101020101" pitchFamily="18" charset="-127"/>
+                <a:ea typeface="아리따-돋움(TTF)-Bold" panose="02020603020101020101" pitchFamily="18" charset="-127"/>
+              </a:rPr>
+              <a:t>12000 </a:t>
+            </a:r>
+            <a:r>
+              <a:rPr lang="ko-KR" altLang="en-US" sz="1050" dirty="0">
+                <a:solidFill>
+                  <a:prstClr val="black">
+                    <a:lumMod val="85000"/>
+                    <a:lumOff val="15000"/>
+                  </a:prstClr>
+                </a:solidFill>
+                <a:latin typeface="아리따-돋움(TTF)-Bold" panose="02020603020101020101" pitchFamily="18" charset="-127"/>
+                <a:ea typeface="아리따-돋움(TTF)-Bold" panose="02020603020101020101" pitchFamily="18" charset="-127"/>
+              </a:rPr>
+              <a:t>포트번호로 </a:t>
+            </a:r>
+            <a:endParaRPr lang="en-US" altLang="ko-KR" sz="1050" dirty="0">
               <a:solidFill>
                 <a:prstClr val="black">
                   <a:lumMod val="85000"/>
@@ -11195,12 +10034,172 @@
               <a:ea typeface="아리따-돋움(TTF)-Bold" panose="02020603020101020101" pitchFamily="18" charset="-127"/>
             </a:endParaRPr>
           </a:p>
-        </p:txBody>
-      </p:sp>
+          <a:p>
+            <a:pPr lvl="0">
+              <a:lnSpc>
+                <a:spcPct val="150000"/>
+              </a:lnSpc>
+              <a:defRPr/>
+            </a:pPr>
+            <a:r>
+              <a:rPr lang="ko-KR" altLang="en-US" sz="1050" dirty="0">
+                <a:solidFill>
+                  <a:prstClr val="black">
+                    <a:lumMod val="85000"/>
+                    <a:lumOff val="15000"/>
+                  </a:prstClr>
+                </a:solidFill>
+                <a:latin typeface="아리따-돋움(TTF)-Bold" panose="02020603020101020101" pitchFamily="18" charset="-127"/>
+                <a:ea typeface="아리따-돋움(TTF)-Bold" panose="02020603020101020101" pitchFamily="18" charset="-127"/>
+              </a:rPr>
+              <a:t>서버에 데이터를 전송하고 서버로부터 수정된 데이터를 다시 </a:t>
+            </a:r>
+            <a:r>
+              <a:rPr lang="ko-KR" altLang="en-US" sz="1050" dirty="0" err="1">
+                <a:solidFill>
+                  <a:prstClr val="black">
+                    <a:lumMod val="85000"/>
+                    <a:lumOff val="15000"/>
+                  </a:prstClr>
+                </a:solidFill>
+                <a:latin typeface="아리따-돋움(TTF)-Bold" panose="02020603020101020101" pitchFamily="18" charset="-127"/>
+                <a:ea typeface="아리따-돋움(TTF)-Bold" panose="02020603020101020101" pitchFamily="18" charset="-127"/>
+              </a:rPr>
+              <a:t>전송받는</a:t>
+            </a:r>
+            <a:r>
+              <a:rPr lang="ko-KR" altLang="en-US" sz="1050" dirty="0">
+                <a:solidFill>
+                  <a:prstClr val="black">
+                    <a:lumMod val="85000"/>
+                    <a:lumOff val="15000"/>
+                  </a:prstClr>
+                </a:solidFill>
+                <a:latin typeface="아리따-돋움(TTF)-Bold" panose="02020603020101020101" pitchFamily="18" charset="-127"/>
+                <a:ea typeface="아리따-돋움(TTF)-Bold" panose="02020603020101020101" pitchFamily="18" charset="-127"/>
+              </a:rPr>
+              <a:t> 모습을 확인할 수 있다</a:t>
+            </a:r>
+            <a:r>
+              <a:rPr lang="en-US" altLang="ko-KR" sz="1050" dirty="0">
+                <a:solidFill>
+                  <a:prstClr val="black">
+                    <a:lumMod val="85000"/>
+                    <a:lumOff val="15000"/>
+                  </a:prstClr>
+                </a:solidFill>
+                <a:latin typeface="아리따-돋움(TTF)-Bold" panose="02020603020101020101" pitchFamily="18" charset="-127"/>
+                <a:ea typeface="아리따-돋움(TTF)-Bold" panose="02020603020101020101" pitchFamily="18" charset="-127"/>
+              </a:rPr>
+              <a:t>.</a:t>
+            </a:r>
+            <a:endParaRPr lang="en-US" altLang="ko-KR" sz="1050" b="1" dirty="0">
+              <a:solidFill>
+                <a:prstClr val="black">
+                  <a:lumMod val="85000"/>
+                  <a:lumOff val="15000"/>
+                </a:prstClr>
+              </a:solidFill>
+              <a:latin typeface="아리따-돋움(TTF)-Bold" panose="02020603020101020101" pitchFamily="18" charset="-127"/>
+              <a:ea typeface="아리따-돋움(TTF)-Bold" panose="02020603020101020101" pitchFamily="18" charset="-127"/>
+            </a:endParaRPr>
+          </a:p>
+        </p:txBody>
+      </p:sp>
+      <p:pic>
+        <p:nvPicPr>
+          <p:cNvPr id="7" name="그림 6">
+            <a:extLst>
+              <a:ext uri="{FF2B5EF4-FFF2-40B4-BE49-F238E27FC236}">
+                <a16:creationId xmlns:a16="http://schemas.microsoft.com/office/drawing/2014/main" id="{AE45D577-8859-446B-BB34-D8DD26683DB3}"/>
+              </a:ext>
+            </a:extLst>
+          </p:cNvPr>
+          <p:cNvPicPr>
+            <a:picLocks noChangeAspect="1"/>
+          </p:cNvPicPr>
+          <p:nvPr/>
+        </p:nvPicPr>
+        <p:blipFill>
+          <a:blip r:embed="rId3"/>
+          <a:stretch>
+            <a:fillRect/>
+          </a:stretch>
+        </p:blipFill>
+        <p:spPr>
+          <a:xfrm>
+            <a:off x="498455" y="777643"/>
+            <a:ext cx="4596974" cy="2398694"/>
+          </a:xfrm>
+          <a:prstGeom prst="rect">
+            <a:avLst/>
+          </a:prstGeom>
+        </p:spPr>
+      </p:pic>
+      <p:pic>
+        <p:nvPicPr>
+          <p:cNvPr id="8" name="그림 7">
+            <a:extLst>
+              <a:ext uri="{FF2B5EF4-FFF2-40B4-BE49-F238E27FC236}">
+                <a16:creationId xmlns:a16="http://schemas.microsoft.com/office/drawing/2014/main" id="{1E079832-40B5-4B6C-AE8C-EECFF8370707}"/>
+              </a:ext>
+            </a:extLst>
+          </p:cNvPr>
+          <p:cNvPicPr>
+            <a:picLocks noChangeAspect="1"/>
+          </p:cNvPicPr>
+          <p:nvPr/>
+        </p:nvPicPr>
+        <p:blipFill>
+          <a:blip r:embed="rId4"/>
+          <a:stretch>
+            <a:fillRect/>
+          </a:stretch>
+        </p:blipFill>
+        <p:spPr>
+          <a:xfrm>
+            <a:off x="498455" y="1255944"/>
+            <a:ext cx="4577188" cy="2388370"/>
+          </a:xfrm>
+          <a:prstGeom prst="rect">
+            <a:avLst/>
+          </a:prstGeom>
+        </p:spPr>
+      </p:pic>
+      <p:pic>
+        <p:nvPicPr>
+          <p:cNvPr id="9" name="그림 8">
+            <a:extLst>
+              <a:ext uri="{FF2B5EF4-FFF2-40B4-BE49-F238E27FC236}">
+                <a16:creationId xmlns:a16="http://schemas.microsoft.com/office/drawing/2014/main" id="{DDBE04B0-BC70-4130-B38C-CB07F64399F5}"/>
+              </a:ext>
+            </a:extLst>
+          </p:cNvPr>
+          <p:cNvPicPr>
+            <a:picLocks noChangeAspect="1"/>
+          </p:cNvPicPr>
+          <p:nvPr/>
+        </p:nvPicPr>
+        <p:blipFill>
+          <a:blip r:embed="rId5"/>
+          <a:stretch>
+            <a:fillRect/>
+          </a:stretch>
+        </p:blipFill>
+        <p:spPr>
+          <a:xfrm>
+            <a:off x="5095429" y="777642"/>
+            <a:ext cx="4689107" cy="2866671"/>
+          </a:xfrm>
+          <a:prstGeom prst="rect">
+            <a:avLst/>
+          </a:prstGeom>
+        </p:spPr>
+      </p:pic>
     </p:spTree>
     <p:extLst>
       <p:ext uri="{BB962C8B-B14F-4D97-AF65-F5344CB8AC3E}">
-        <p14:creationId xmlns:p14="http://schemas.microsoft.com/office/powerpoint/2010/main" val="2442900214"/>
+        <p14:creationId xmlns:p14="http://schemas.microsoft.com/office/powerpoint/2010/main" val="3409179288"/>
       </p:ext>
     </p:extLst>
   </p:cSld>
@@ -11243,82 +10242,1721 @@
       </p:grpSpPr>
       <p:sp>
         <p:nvSpPr>
-          <p:cNvPr id="4" name="직사각형 3"/>
+          <p:cNvPr id="13" name="직사각형 12"/>
           <p:cNvSpPr/>
           <p:nvPr/>
         </p:nvSpPr>
         <p:spPr>
           <a:xfrm>
-            <a:off x="3342687" y="2951946"/>
-            <a:ext cx="3220625" cy="477054"/>
+            <a:off x="500352" y="276052"/>
+            <a:ext cx="4350322" cy="400110"/>
           </a:xfrm>
           <a:prstGeom prst="rect">
             <a:avLst/>
           </a:prstGeom>
         </p:spPr>
         <p:txBody>
-          <a:bodyPr wrap="none">
+          <a:bodyPr wrap="square">
             <a:spAutoFit/>
           </a:bodyPr>
           <a:lstStyle/>
           <a:p>
-            <a:r>
-              <a:rPr lang="en-US" altLang="ko-KR" sz="2500" dirty="0">
-                <a:solidFill>
-                  <a:prstClr val="white">
-                    <a:lumMod val="95000"/>
-                  </a:prstClr>
-                </a:solidFill>
-              </a:rPr>
-              <a:t>Thank</a:t>
-            </a:r>
-            <a:r>
-              <a:rPr lang="ko-KR" altLang="en-US" sz="2500" dirty="0">
-                <a:solidFill>
-                  <a:prstClr val="white">
-                    <a:lumMod val="95000"/>
-                  </a:prstClr>
-                </a:solidFill>
-              </a:rPr>
-              <a:t> </a:t>
-            </a:r>
-            <a:r>
-              <a:rPr lang="en-US" altLang="ko-KR" sz="2500" dirty="0">
-                <a:solidFill>
-                  <a:prstClr val="white">
-                    <a:lumMod val="95000"/>
-                  </a:prstClr>
-                </a:solidFill>
-              </a:rPr>
-              <a:t>you</a:t>
-            </a:r>
-            <a:r>
-              <a:rPr lang="ko-KR" altLang="en-US" sz="2500" dirty="0">
-                <a:solidFill>
-                  <a:prstClr val="white">
-                    <a:lumMod val="95000"/>
-                  </a:prstClr>
-                </a:solidFill>
-              </a:rPr>
-              <a:t> </a:t>
-            </a:r>
-            <a:r>
-              <a:rPr lang="en-US" altLang="ko-KR" sz="2500" dirty="0">
-                <a:solidFill>
-                  <a:prstClr val="white">
-                    <a:lumMod val="95000"/>
-                  </a:prstClr>
-                </a:solidFill>
-              </a:rPr>
-              <a:t>for watching</a:t>
-            </a:r>
+            <a:pPr marL="0" marR="0" lvl="0" indent="0" algn="l" defTabSz="914400" rtl="0" eaLnBrk="1" fontAlgn="auto" latinLnBrk="1" hangingPunct="1">
+              <a:lnSpc>
+                <a:spcPct val="100000"/>
+              </a:lnSpc>
+              <a:spcBef>
+                <a:spcPts val="0"/>
+              </a:spcBef>
+              <a:spcAft>
+                <a:spcPts val="0"/>
+              </a:spcAft>
+              <a:buClrTx/>
+              <a:buSzTx/>
+              <a:buFontTx/>
+              <a:buNone/>
+              <a:tabLst/>
+              <a:defRPr/>
+            </a:pPr>
+            <a:r>
+              <a:rPr lang="ko-KR" altLang="en-US" sz="2000" dirty="0">
+                <a:solidFill>
+                  <a:prstClr val="black"/>
+                </a:solidFill>
+                <a:latin typeface="맑은 고딕" panose="020B0503020000020004" pitchFamily="50" charset="-127"/>
+                <a:ea typeface="맑은 고딕" panose="020B0503020000020004" pitchFamily="50" charset="-127"/>
+              </a:rPr>
+              <a:t>결과</a:t>
+            </a:r>
+            <a:endParaRPr kumimoji="0" lang="ko-KR" altLang="en-US" sz="2000" b="0" i="0" u="none" strike="noStrike" kern="1200" cap="none" spc="0" normalizeH="0" baseline="0" noProof="0" dirty="0">
+              <a:ln>
+                <a:noFill/>
+              </a:ln>
+              <a:solidFill>
+                <a:prstClr val="black"/>
+              </a:solidFill>
+              <a:effectLst/>
+              <a:uLnTx/>
+              <a:uFillTx/>
+              <a:latin typeface="맑은 고딕" panose="020B0503020000020004" pitchFamily="50" charset="-127"/>
+              <a:ea typeface="맑은 고딕" panose="020B0503020000020004" pitchFamily="50" charset="-127"/>
+              <a:cs typeface="+mn-cs"/>
+            </a:endParaRPr>
+          </a:p>
+        </p:txBody>
+      </p:sp>
+      <p:sp>
+        <p:nvSpPr>
+          <p:cNvPr id="8" name="직사각형 7">
+            <a:extLst>
+              <a:ext uri="{FF2B5EF4-FFF2-40B4-BE49-F238E27FC236}">
+                <a16:creationId xmlns:a16="http://schemas.microsoft.com/office/drawing/2014/main" id="{6BAA6143-2FE2-4F73-AA81-2F8AF2749F08}"/>
+              </a:ext>
+            </a:extLst>
+          </p:cNvPr>
+          <p:cNvSpPr/>
+          <p:nvPr/>
+        </p:nvSpPr>
+        <p:spPr>
+          <a:xfrm>
+            <a:off x="1974474" y="1520100"/>
+            <a:ext cx="5922211" cy="1891352"/>
+          </a:xfrm>
+          <a:prstGeom prst="rect">
+            <a:avLst/>
+          </a:prstGeom>
+          <a:noFill/>
+        </p:spPr>
+        <p:txBody>
+          <a:bodyPr wrap="square">
+            <a:spAutoFit/>
+          </a:bodyPr>
+          <a:lstStyle/>
+          <a:p>
+            <a:pPr marL="0" marR="0" lvl="0" indent="0" algn="ctr" defTabSz="914400" rtl="0" eaLnBrk="1" fontAlgn="auto" latinLnBrk="1" hangingPunct="1">
+              <a:lnSpc>
+                <a:spcPct val="150000"/>
+              </a:lnSpc>
+              <a:spcBef>
+                <a:spcPts val="0"/>
+              </a:spcBef>
+              <a:spcAft>
+                <a:spcPts val="0"/>
+              </a:spcAft>
+              <a:buClrTx/>
+              <a:buSzTx/>
+              <a:buFontTx/>
+              <a:buNone/>
+              <a:tabLst/>
+              <a:defRPr/>
+            </a:pPr>
+            <a:r>
+              <a:rPr lang="ko-KR" altLang="en-US" sz="1600" b="1" dirty="0">
+                <a:solidFill>
+                  <a:prstClr val="black">
+                    <a:lumMod val="85000"/>
+                    <a:lumOff val="15000"/>
+                  </a:prstClr>
+                </a:solidFill>
+                <a:latin typeface="아리따-돋움(TTF)-Bold" panose="02020603020101020101" pitchFamily="18" charset="-127"/>
+                <a:ea typeface="아리따-돋움(TTF)-Bold" panose="02020603020101020101" pitchFamily="18" charset="-127"/>
+              </a:rPr>
+              <a:t>인접 국가에 대한 추적</a:t>
+            </a:r>
+            <a:r>
+              <a:rPr lang="ko-KR" altLang="en-US" sz="1600" dirty="0">
+                <a:solidFill>
+                  <a:prstClr val="black">
+                    <a:lumMod val="85000"/>
+                    <a:lumOff val="15000"/>
+                  </a:prstClr>
+                </a:solidFill>
+                <a:latin typeface="아리따-돋움(TTF)-Bold" panose="02020603020101020101" pitchFamily="18" charset="-127"/>
+                <a:ea typeface="아리따-돋움(TTF)-Bold" panose="02020603020101020101" pitchFamily="18" charset="-127"/>
+              </a:rPr>
+              <a:t>은  적은 홉의 개수 및 라우터로 </a:t>
+            </a:r>
+            <a:endParaRPr lang="en-US" altLang="ko-KR" sz="1600" dirty="0">
+              <a:solidFill>
+                <a:prstClr val="black">
+                  <a:lumMod val="85000"/>
+                  <a:lumOff val="15000"/>
+                </a:prstClr>
+              </a:solidFill>
+              <a:latin typeface="아리따-돋움(TTF)-Bold" panose="02020603020101020101" pitchFamily="18" charset="-127"/>
+              <a:ea typeface="아리따-돋움(TTF)-Bold" panose="02020603020101020101" pitchFamily="18" charset="-127"/>
+            </a:endParaRPr>
+          </a:p>
+          <a:p>
+            <a:pPr lvl="0" algn="ctr">
+              <a:lnSpc>
+                <a:spcPct val="150000"/>
+              </a:lnSpc>
+              <a:defRPr/>
+            </a:pPr>
+            <a:r>
+              <a:rPr lang="ko-KR" altLang="en-US" sz="1600" dirty="0">
+                <a:solidFill>
+                  <a:prstClr val="black">
+                    <a:lumMod val="85000"/>
+                    <a:lumOff val="15000"/>
+                  </a:prstClr>
+                </a:solidFill>
+                <a:latin typeface="아리따-돋움(TTF)-Bold" panose="02020603020101020101" pitchFamily="18" charset="-127"/>
+                <a:ea typeface="아리따-돋움(TTF)-Bold" panose="02020603020101020101" pitchFamily="18" charset="-127"/>
+              </a:rPr>
+              <a:t>목표지점까지 도달할 수 있음을 확인 할 수 있었으며 </a:t>
+            </a:r>
+            <a:r>
+              <a:rPr lang="ko-KR" altLang="en-US" sz="1600" b="1" dirty="0">
+                <a:solidFill>
+                  <a:prstClr val="black">
+                    <a:lumMod val="85000"/>
+                    <a:lumOff val="15000"/>
+                  </a:prstClr>
+                </a:solidFill>
+                <a:latin typeface="아리따-돋움(TTF)-Bold" panose="02020603020101020101" pitchFamily="18" charset="-127"/>
+                <a:ea typeface="아리따-돋움(TTF)-Bold" panose="02020603020101020101" pitchFamily="18" charset="-127"/>
+              </a:rPr>
+              <a:t>상대적으로 먼 거리에 위치한 대륙에 대한 추적은 </a:t>
+            </a:r>
+            <a:r>
+              <a:rPr lang="ko-KR" altLang="en-US" sz="1600" dirty="0">
+                <a:solidFill>
+                  <a:prstClr val="black">
+                    <a:lumMod val="85000"/>
+                    <a:lumOff val="15000"/>
+                  </a:prstClr>
+                </a:solidFill>
+                <a:latin typeface="아리따-돋움(TTF)-Bold" panose="02020603020101020101" pitchFamily="18" charset="-127"/>
+                <a:ea typeface="아리따-돋움(TTF)-Bold" panose="02020603020101020101" pitchFamily="18" charset="-127"/>
+              </a:rPr>
+              <a:t>목표지점까지 도달함에 있어 다소 많은 홉의 개수 및 라우터를 통해 도달함을 확인할 수 있다</a:t>
+            </a:r>
+            <a:r>
+              <a:rPr lang="en-US" altLang="ko-KR" sz="1600" dirty="0">
+                <a:solidFill>
+                  <a:prstClr val="black">
+                    <a:lumMod val="85000"/>
+                    <a:lumOff val="15000"/>
+                  </a:prstClr>
+                </a:solidFill>
+                <a:latin typeface="아리따-돋움(TTF)-Bold" panose="02020603020101020101" pitchFamily="18" charset="-127"/>
+                <a:ea typeface="아리따-돋움(TTF)-Bold" panose="02020603020101020101" pitchFamily="18" charset="-127"/>
+              </a:rPr>
+              <a:t>.</a:t>
+            </a:r>
+            <a:endParaRPr kumimoji="0" lang="en-US" altLang="ko-KR" sz="1600" i="0" u="none" strike="noStrike" kern="1200" cap="none" spc="0" normalizeH="0" baseline="0" noProof="0" dirty="0">
+              <a:ln>
+                <a:noFill/>
+              </a:ln>
+              <a:solidFill>
+                <a:prstClr val="black">
+                  <a:lumMod val="85000"/>
+                  <a:lumOff val="15000"/>
+                </a:prstClr>
+              </a:solidFill>
+              <a:effectLst/>
+              <a:uLnTx/>
+              <a:uFillTx/>
+              <a:latin typeface="아리따-돋움(TTF)-Bold" panose="02020603020101020101" pitchFamily="18" charset="-127"/>
+              <a:ea typeface="아리따-돋움(TTF)-Bold" panose="02020603020101020101" pitchFamily="18" charset="-127"/>
+              <a:cs typeface="+mn-cs"/>
+            </a:endParaRPr>
+          </a:p>
+        </p:txBody>
+      </p:sp>
+      <p:sp>
+        <p:nvSpPr>
+          <p:cNvPr id="9" name="직사각형 8">
+            <a:extLst>
+              <a:ext uri="{FF2B5EF4-FFF2-40B4-BE49-F238E27FC236}">
+                <a16:creationId xmlns:a16="http://schemas.microsoft.com/office/drawing/2014/main" id="{BD2A37E6-181D-44FE-A75F-9C02BD9D1628}"/>
+              </a:ext>
+            </a:extLst>
+          </p:cNvPr>
+          <p:cNvSpPr/>
+          <p:nvPr/>
+        </p:nvSpPr>
+        <p:spPr>
+          <a:xfrm>
+            <a:off x="4095157" y="1147413"/>
+            <a:ext cx="1535502" cy="400110"/>
+          </a:xfrm>
+          <a:prstGeom prst="rect">
+            <a:avLst/>
+          </a:prstGeom>
+          <a:noFill/>
+        </p:spPr>
+        <p:txBody>
+          <a:bodyPr wrap="square">
+            <a:spAutoFit/>
+          </a:bodyPr>
+          <a:lstStyle/>
+          <a:p>
+            <a:pPr marL="0" marR="0" lvl="0" indent="0" algn="ctr" defTabSz="914400" rtl="0" eaLnBrk="1" fontAlgn="auto" latinLnBrk="1" hangingPunct="1">
+              <a:lnSpc>
+                <a:spcPct val="100000"/>
+              </a:lnSpc>
+              <a:spcBef>
+                <a:spcPts val="0"/>
+              </a:spcBef>
+              <a:spcAft>
+                <a:spcPts val="0"/>
+              </a:spcAft>
+              <a:buClrTx/>
+              <a:buSzTx/>
+              <a:buFontTx/>
+              <a:buNone/>
+              <a:tabLst/>
+              <a:defRPr/>
+            </a:pPr>
+            <a:r>
+              <a:rPr kumimoji="0" lang="ko-KR" altLang="en-US" sz="2000" b="1" i="0" u="none" strike="noStrike" kern="1200" cap="none" spc="0" normalizeH="0" baseline="0" noProof="0" dirty="0">
+                <a:ln>
+                  <a:noFill/>
+                </a:ln>
+                <a:solidFill>
+                  <a:prstClr val="black">
+                    <a:lumMod val="65000"/>
+                    <a:lumOff val="35000"/>
+                  </a:prstClr>
+                </a:solidFill>
+                <a:effectLst/>
+                <a:uLnTx/>
+                <a:uFillTx/>
+                <a:latin typeface="아리따-돋움(TTF)-Medium" panose="02020603020101020101" pitchFamily="18" charset="-127"/>
+                <a:ea typeface="아리따-돋움(TTF)-Medium" panose="02020603020101020101" pitchFamily="18" charset="-127"/>
+                <a:cs typeface="+mn-cs"/>
+              </a:rPr>
+              <a:t>추적 결과</a:t>
+            </a:r>
+            <a:endParaRPr kumimoji="0" lang="en-US" altLang="ko-KR" sz="2000" b="1" i="0" u="none" strike="noStrike" kern="1200" cap="none" spc="0" normalizeH="0" baseline="0" noProof="0" dirty="0">
+              <a:ln>
+                <a:noFill/>
+              </a:ln>
+              <a:solidFill>
+                <a:prstClr val="black">
+                  <a:lumMod val="65000"/>
+                  <a:lumOff val="35000"/>
+                </a:prstClr>
+              </a:solidFill>
+              <a:effectLst/>
+              <a:uLnTx/>
+              <a:uFillTx/>
+              <a:latin typeface="아리따-돋움(TTF)-Medium" panose="02020603020101020101" pitchFamily="18" charset="-127"/>
+              <a:ea typeface="아리따-돋움(TTF)-Medium" panose="02020603020101020101" pitchFamily="18" charset="-127"/>
+              <a:cs typeface="+mn-cs"/>
+            </a:endParaRPr>
+          </a:p>
+        </p:txBody>
+      </p:sp>
+      <p:sp>
+        <p:nvSpPr>
+          <p:cNvPr id="10" name="타원 9">
+            <a:extLst>
+              <a:ext uri="{FF2B5EF4-FFF2-40B4-BE49-F238E27FC236}">
+                <a16:creationId xmlns:a16="http://schemas.microsoft.com/office/drawing/2014/main" id="{F3EB148D-9BD4-41B6-8574-2762ED9CB526}"/>
+              </a:ext>
+            </a:extLst>
+          </p:cNvPr>
+          <p:cNvSpPr/>
+          <p:nvPr/>
+        </p:nvSpPr>
+        <p:spPr>
+          <a:xfrm>
+            <a:off x="2469305" y="4107516"/>
+            <a:ext cx="291490" cy="291490"/>
+          </a:xfrm>
+          <a:prstGeom prst="ellipse">
+            <a:avLst/>
+          </a:prstGeom>
+          <a:solidFill>
+            <a:schemeClr val="tx1">
+              <a:lumMod val="85000"/>
+              <a:lumOff val="15000"/>
+            </a:schemeClr>
+          </a:solidFill>
+          <a:ln w="76200">
+            <a:solidFill>
+              <a:schemeClr val="accent1">
+                <a:lumMod val="75000"/>
+              </a:schemeClr>
+            </a:solidFill>
+          </a:ln>
+        </p:spPr>
+        <p:style>
+          <a:lnRef idx="2">
+            <a:schemeClr val="accent1">
+              <a:shade val="50000"/>
+            </a:schemeClr>
+          </a:lnRef>
+          <a:fillRef idx="1">
+            <a:schemeClr val="accent1"/>
+          </a:fillRef>
+          <a:effectRef idx="0">
+            <a:schemeClr val="accent1"/>
+          </a:effectRef>
+          <a:fontRef idx="minor">
+            <a:schemeClr val="lt1"/>
+          </a:fontRef>
+        </p:style>
+        <p:txBody>
+          <a:bodyPr rtlCol="0" anchor="ctr"/>
+          <a:lstStyle/>
+          <a:p>
+            <a:pPr algn="ctr"/>
+            <a:endParaRPr lang="ko-KR" altLang="en-US">
+              <a:solidFill>
+                <a:prstClr val="white"/>
+              </a:solidFill>
+            </a:endParaRPr>
+          </a:p>
+        </p:txBody>
+      </p:sp>
+      <p:sp>
+        <p:nvSpPr>
+          <p:cNvPr id="11" name="타원 10">
+            <a:extLst>
+              <a:ext uri="{FF2B5EF4-FFF2-40B4-BE49-F238E27FC236}">
+                <a16:creationId xmlns:a16="http://schemas.microsoft.com/office/drawing/2014/main" id="{207FE451-94F7-4465-BEDC-0E0C56C52662}"/>
+              </a:ext>
+            </a:extLst>
+          </p:cNvPr>
+          <p:cNvSpPr/>
+          <p:nvPr/>
+        </p:nvSpPr>
+        <p:spPr>
+          <a:xfrm>
+            <a:off x="3017793" y="3838405"/>
+            <a:ext cx="291490" cy="291490"/>
+          </a:xfrm>
+          <a:prstGeom prst="ellipse">
+            <a:avLst/>
+          </a:prstGeom>
+          <a:solidFill>
+            <a:schemeClr val="tx1">
+              <a:lumMod val="85000"/>
+              <a:lumOff val="15000"/>
+            </a:schemeClr>
+          </a:solidFill>
+          <a:ln w="76200">
+            <a:solidFill>
+              <a:schemeClr val="accent1">
+                <a:lumMod val="75000"/>
+              </a:schemeClr>
+            </a:solidFill>
+          </a:ln>
+        </p:spPr>
+        <p:style>
+          <a:lnRef idx="2">
+            <a:schemeClr val="accent1">
+              <a:shade val="50000"/>
+            </a:schemeClr>
+          </a:lnRef>
+          <a:fillRef idx="1">
+            <a:schemeClr val="accent1"/>
+          </a:fillRef>
+          <a:effectRef idx="0">
+            <a:schemeClr val="accent1"/>
+          </a:effectRef>
+          <a:fontRef idx="minor">
+            <a:schemeClr val="lt1"/>
+          </a:fontRef>
+        </p:style>
+        <p:txBody>
+          <a:bodyPr rtlCol="0" anchor="ctr"/>
+          <a:lstStyle/>
+          <a:p>
+            <a:pPr algn="ctr"/>
+            <a:endParaRPr lang="ko-KR" altLang="en-US">
+              <a:solidFill>
+                <a:prstClr val="white"/>
+              </a:solidFill>
+            </a:endParaRPr>
+          </a:p>
+        </p:txBody>
+      </p:sp>
+      <p:sp>
+        <p:nvSpPr>
+          <p:cNvPr id="14" name="타원 13">
+            <a:extLst>
+              <a:ext uri="{FF2B5EF4-FFF2-40B4-BE49-F238E27FC236}">
+                <a16:creationId xmlns:a16="http://schemas.microsoft.com/office/drawing/2014/main" id="{A6A6CD13-72C2-45C3-8431-0DD95F2CB47B}"/>
+              </a:ext>
+            </a:extLst>
+          </p:cNvPr>
+          <p:cNvSpPr/>
+          <p:nvPr/>
+        </p:nvSpPr>
+        <p:spPr>
+          <a:xfrm>
+            <a:off x="3589758" y="4081683"/>
+            <a:ext cx="291490" cy="291490"/>
+          </a:xfrm>
+          <a:prstGeom prst="ellipse">
+            <a:avLst/>
+          </a:prstGeom>
+          <a:solidFill>
+            <a:schemeClr val="tx1">
+              <a:lumMod val="85000"/>
+              <a:lumOff val="15000"/>
+            </a:schemeClr>
+          </a:solidFill>
+          <a:ln w="76200">
+            <a:solidFill>
+              <a:schemeClr val="accent1">
+                <a:lumMod val="75000"/>
+              </a:schemeClr>
+            </a:solidFill>
+          </a:ln>
+        </p:spPr>
+        <p:style>
+          <a:lnRef idx="2">
+            <a:schemeClr val="accent1">
+              <a:shade val="50000"/>
+            </a:schemeClr>
+          </a:lnRef>
+          <a:fillRef idx="1">
+            <a:schemeClr val="accent1"/>
+          </a:fillRef>
+          <a:effectRef idx="0">
+            <a:schemeClr val="accent1"/>
+          </a:effectRef>
+          <a:fontRef idx="minor">
+            <a:schemeClr val="lt1"/>
+          </a:fontRef>
+        </p:style>
+        <p:txBody>
+          <a:bodyPr rtlCol="0" anchor="ctr"/>
+          <a:lstStyle/>
+          <a:p>
+            <a:pPr algn="ctr"/>
+            <a:endParaRPr lang="ko-KR" altLang="en-US">
+              <a:solidFill>
+                <a:prstClr val="white"/>
+              </a:solidFill>
+            </a:endParaRPr>
+          </a:p>
+        </p:txBody>
+      </p:sp>
+      <p:sp>
+        <p:nvSpPr>
+          <p:cNvPr id="15" name="타원 14">
+            <a:extLst>
+              <a:ext uri="{FF2B5EF4-FFF2-40B4-BE49-F238E27FC236}">
+                <a16:creationId xmlns:a16="http://schemas.microsoft.com/office/drawing/2014/main" id="{F9ECAFB7-7B83-4247-BF7E-D6775643F8C1}"/>
+              </a:ext>
+            </a:extLst>
+          </p:cNvPr>
+          <p:cNvSpPr/>
+          <p:nvPr/>
+        </p:nvSpPr>
+        <p:spPr>
+          <a:xfrm>
+            <a:off x="2534662" y="4171822"/>
+            <a:ext cx="177281" cy="177281"/>
+          </a:xfrm>
+          <a:prstGeom prst="ellipse">
+            <a:avLst/>
+          </a:prstGeom>
+          <a:solidFill>
+            <a:schemeClr val="bg1">
+              <a:lumMod val="95000"/>
+            </a:schemeClr>
+          </a:solidFill>
+          <a:ln w="57150">
+            <a:solidFill>
+              <a:schemeClr val="accent1">
+                <a:lumMod val="75000"/>
+              </a:schemeClr>
+            </a:solidFill>
+          </a:ln>
+        </p:spPr>
+        <p:style>
+          <a:lnRef idx="2">
+            <a:schemeClr val="accent1">
+              <a:shade val="50000"/>
+            </a:schemeClr>
+          </a:lnRef>
+          <a:fillRef idx="1">
+            <a:schemeClr val="accent1"/>
+          </a:fillRef>
+          <a:effectRef idx="0">
+            <a:schemeClr val="accent1"/>
+          </a:effectRef>
+          <a:fontRef idx="minor">
+            <a:schemeClr val="lt1"/>
+          </a:fontRef>
+        </p:style>
+        <p:txBody>
+          <a:bodyPr rtlCol="0" anchor="ctr"/>
+          <a:lstStyle/>
+          <a:p>
+            <a:pPr algn="ctr"/>
+            <a:endParaRPr lang="ko-KR" altLang="en-US" dirty="0">
+              <a:solidFill>
+                <a:prstClr val="white"/>
+              </a:solidFill>
+            </a:endParaRPr>
+          </a:p>
+        </p:txBody>
+      </p:sp>
+      <p:sp>
+        <p:nvSpPr>
+          <p:cNvPr id="17" name="타원 16">
+            <a:extLst>
+              <a:ext uri="{FF2B5EF4-FFF2-40B4-BE49-F238E27FC236}">
+                <a16:creationId xmlns:a16="http://schemas.microsoft.com/office/drawing/2014/main" id="{500A237C-8E68-4B60-B601-01E42237F852}"/>
+              </a:ext>
+            </a:extLst>
+          </p:cNvPr>
+          <p:cNvSpPr/>
+          <p:nvPr/>
+        </p:nvSpPr>
+        <p:spPr>
+          <a:xfrm>
+            <a:off x="3074896" y="3895509"/>
+            <a:ext cx="177281" cy="177281"/>
+          </a:xfrm>
+          <a:prstGeom prst="ellipse">
+            <a:avLst/>
+          </a:prstGeom>
+          <a:solidFill>
+            <a:schemeClr val="bg1">
+              <a:lumMod val="95000"/>
+            </a:schemeClr>
+          </a:solidFill>
+          <a:ln w="57150">
+            <a:solidFill>
+              <a:schemeClr val="accent1">
+                <a:lumMod val="75000"/>
+              </a:schemeClr>
+            </a:solidFill>
+          </a:ln>
+        </p:spPr>
+        <p:style>
+          <a:lnRef idx="2">
+            <a:schemeClr val="accent1">
+              <a:shade val="50000"/>
+            </a:schemeClr>
+          </a:lnRef>
+          <a:fillRef idx="1">
+            <a:schemeClr val="accent1"/>
+          </a:fillRef>
+          <a:effectRef idx="0">
+            <a:schemeClr val="accent1"/>
+          </a:effectRef>
+          <a:fontRef idx="minor">
+            <a:schemeClr val="lt1"/>
+          </a:fontRef>
+        </p:style>
+        <p:txBody>
+          <a:bodyPr rtlCol="0" anchor="ctr"/>
+          <a:lstStyle/>
+          <a:p>
+            <a:pPr algn="ctr"/>
+            <a:endParaRPr lang="ko-KR" altLang="en-US">
+              <a:solidFill>
+                <a:prstClr val="white"/>
+              </a:solidFill>
+            </a:endParaRPr>
+          </a:p>
+        </p:txBody>
+      </p:sp>
+      <p:sp>
+        <p:nvSpPr>
+          <p:cNvPr id="19" name="타원 18">
+            <a:extLst>
+              <a:ext uri="{FF2B5EF4-FFF2-40B4-BE49-F238E27FC236}">
+                <a16:creationId xmlns:a16="http://schemas.microsoft.com/office/drawing/2014/main" id="{1445CAE6-C40B-4A50-A810-FA34C3D65FF6}"/>
+              </a:ext>
+            </a:extLst>
+          </p:cNvPr>
+          <p:cNvSpPr/>
+          <p:nvPr/>
+        </p:nvSpPr>
+        <p:spPr>
+          <a:xfrm>
+            <a:off x="3646862" y="4138787"/>
+            <a:ext cx="177281" cy="177281"/>
+          </a:xfrm>
+          <a:prstGeom prst="ellipse">
+            <a:avLst/>
+          </a:prstGeom>
+          <a:solidFill>
+            <a:schemeClr val="bg1">
+              <a:lumMod val="95000"/>
+            </a:schemeClr>
+          </a:solidFill>
+          <a:ln w="57150">
+            <a:solidFill>
+              <a:schemeClr val="accent1">
+                <a:lumMod val="75000"/>
+              </a:schemeClr>
+            </a:solidFill>
+          </a:ln>
+        </p:spPr>
+        <p:style>
+          <a:lnRef idx="2">
+            <a:schemeClr val="accent1">
+              <a:shade val="50000"/>
+            </a:schemeClr>
+          </a:lnRef>
+          <a:fillRef idx="1">
+            <a:schemeClr val="accent1"/>
+          </a:fillRef>
+          <a:effectRef idx="0">
+            <a:schemeClr val="accent1"/>
+          </a:effectRef>
+          <a:fontRef idx="minor">
+            <a:schemeClr val="lt1"/>
+          </a:fontRef>
+        </p:style>
+        <p:txBody>
+          <a:bodyPr rtlCol="0" anchor="ctr"/>
+          <a:lstStyle/>
+          <a:p>
+            <a:pPr algn="ctr"/>
+            <a:endParaRPr lang="ko-KR" altLang="en-US">
+              <a:solidFill>
+                <a:prstClr val="white"/>
+              </a:solidFill>
+            </a:endParaRPr>
+          </a:p>
+        </p:txBody>
+      </p:sp>
+      <p:sp>
+        <p:nvSpPr>
+          <p:cNvPr id="25" name="타원 24">
+            <a:extLst>
+              <a:ext uri="{FF2B5EF4-FFF2-40B4-BE49-F238E27FC236}">
+                <a16:creationId xmlns:a16="http://schemas.microsoft.com/office/drawing/2014/main" id="{3F78B6BC-E288-4366-97D2-8114EBA18706}"/>
+              </a:ext>
+            </a:extLst>
+          </p:cNvPr>
+          <p:cNvSpPr/>
+          <p:nvPr/>
+        </p:nvSpPr>
+        <p:spPr>
+          <a:xfrm>
+            <a:off x="5820100" y="4011505"/>
+            <a:ext cx="291490" cy="291490"/>
+          </a:xfrm>
+          <a:prstGeom prst="ellipse">
+            <a:avLst/>
+          </a:prstGeom>
+          <a:solidFill>
+            <a:schemeClr val="tx1">
+              <a:lumMod val="85000"/>
+              <a:lumOff val="15000"/>
+            </a:schemeClr>
+          </a:solidFill>
+          <a:ln w="76200">
+            <a:solidFill>
+              <a:schemeClr val="accent1">
+                <a:lumMod val="75000"/>
+              </a:schemeClr>
+            </a:solidFill>
+          </a:ln>
+        </p:spPr>
+        <p:style>
+          <a:lnRef idx="2">
+            <a:schemeClr val="accent1">
+              <a:shade val="50000"/>
+            </a:schemeClr>
+          </a:lnRef>
+          <a:fillRef idx="1">
+            <a:schemeClr val="accent1"/>
+          </a:fillRef>
+          <a:effectRef idx="0">
+            <a:schemeClr val="accent1"/>
+          </a:effectRef>
+          <a:fontRef idx="minor">
+            <a:schemeClr val="lt1"/>
+          </a:fontRef>
+        </p:style>
+        <p:txBody>
+          <a:bodyPr rtlCol="0" anchor="ctr"/>
+          <a:lstStyle/>
+          <a:p>
+            <a:pPr algn="ctr"/>
+            <a:endParaRPr lang="ko-KR" altLang="en-US">
+              <a:solidFill>
+                <a:prstClr val="white"/>
+              </a:solidFill>
+            </a:endParaRPr>
+          </a:p>
+        </p:txBody>
+      </p:sp>
+      <p:sp>
+        <p:nvSpPr>
+          <p:cNvPr id="26" name="타원 25">
+            <a:extLst>
+              <a:ext uri="{FF2B5EF4-FFF2-40B4-BE49-F238E27FC236}">
+                <a16:creationId xmlns:a16="http://schemas.microsoft.com/office/drawing/2014/main" id="{471DAA5F-7270-47DD-A857-BB4628ED06C6}"/>
+              </a:ext>
+            </a:extLst>
+          </p:cNvPr>
+          <p:cNvSpPr/>
+          <p:nvPr/>
+        </p:nvSpPr>
+        <p:spPr>
+          <a:xfrm>
+            <a:off x="6515736" y="3791200"/>
+            <a:ext cx="291490" cy="291490"/>
+          </a:xfrm>
+          <a:prstGeom prst="ellipse">
+            <a:avLst/>
+          </a:prstGeom>
+          <a:solidFill>
+            <a:schemeClr val="tx1">
+              <a:lumMod val="85000"/>
+              <a:lumOff val="15000"/>
+            </a:schemeClr>
+          </a:solidFill>
+          <a:ln w="76200">
+            <a:solidFill>
+              <a:schemeClr val="accent1">
+                <a:lumMod val="75000"/>
+              </a:schemeClr>
+            </a:solidFill>
+          </a:ln>
+        </p:spPr>
+        <p:style>
+          <a:lnRef idx="2">
+            <a:schemeClr val="accent1">
+              <a:shade val="50000"/>
+            </a:schemeClr>
+          </a:lnRef>
+          <a:fillRef idx="1">
+            <a:schemeClr val="accent1"/>
+          </a:fillRef>
+          <a:effectRef idx="0">
+            <a:schemeClr val="accent1"/>
+          </a:effectRef>
+          <a:fontRef idx="minor">
+            <a:schemeClr val="lt1"/>
+          </a:fontRef>
+        </p:style>
+        <p:txBody>
+          <a:bodyPr rtlCol="0" anchor="ctr"/>
+          <a:lstStyle/>
+          <a:p>
+            <a:pPr algn="ctr"/>
+            <a:endParaRPr lang="ko-KR" altLang="en-US">
+              <a:solidFill>
+                <a:prstClr val="white"/>
+              </a:solidFill>
+            </a:endParaRPr>
+          </a:p>
+        </p:txBody>
+      </p:sp>
+      <p:sp>
+        <p:nvSpPr>
+          <p:cNvPr id="27" name="타원 26">
+            <a:extLst>
+              <a:ext uri="{FF2B5EF4-FFF2-40B4-BE49-F238E27FC236}">
+                <a16:creationId xmlns:a16="http://schemas.microsoft.com/office/drawing/2014/main" id="{1DBEF6BA-6B79-4233-B8C5-FF7D4BB683A1}"/>
+              </a:ext>
+            </a:extLst>
+          </p:cNvPr>
+          <p:cNvSpPr/>
+          <p:nvPr/>
+        </p:nvSpPr>
+        <p:spPr>
+          <a:xfrm>
+            <a:off x="7192450" y="4001497"/>
+            <a:ext cx="291490" cy="291490"/>
+          </a:xfrm>
+          <a:prstGeom prst="ellipse">
+            <a:avLst/>
+          </a:prstGeom>
+          <a:solidFill>
+            <a:schemeClr val="tx1">
+              <a:lumMod val="85000"/>
+              <a:lumOff val="15000"/>
+            </a:schemeClr>
+          </a:solidFill>
+          <a:ln w="76200">
+            <a:solidFill>
+              <a:schemeClr val="accent1">
+                <a:lumMod val="75000"/>
+              </a:schemeClr>
+            </a:solidFill>
+          </a:ln>
+        </p:spPr>
+        <p:style>
+          <a:lnRef idx="2">
+            <a:schemeClr val="accent1">
+              <a:shade val="50000"/>
+            </a:schemeClr>
+          </a:lnRef>
+          <a:fillRef idx="1">
+            <a:schemeClr val="accent1"/>
+          </a:fillRef>
+          <a:effectRef idx="0">
+            <a:schemeClr val="accent1"/>
+          </a:effectRef>
+          <a:fontRef idx="minor">
+            <a:schemeClr val="lt1"/>
+          </a:fontRef>
+        </p:style>
+        <p:txBody>
+          <a:bodyPr rtlCol="0" anchor="ctr"/>
+          <a:lstStyle/>
+          <a:p>
+            <a:pPr algn="ctr"/>
+            <a:endParaRPr lang="ko-KR" altLang="en-US">
+              <a:solidFill>
+                <a:prstClr val="white"/>
+              </a:solidFill>
+            </a:endParaRPr>
+          </a:p>
+        </p:txBody>
+      </p:sp>
+      <p:sp>
+        <p:nvSpPr>
+          <p:cNvPr id="28" name="타원 27">
+            <a:extLst>
+              <a:ext uri="{FF2B5EF4-FFF2-40B4-BE49-F238E27FC236}">
+                <a16:creationId xmlns:a16="http://schemas.microsoft.com/office/drawing/2014/main" id="{499A255F-7D94-4908-A699-BCDD10D0560C}"/>
+              </a:ext>
+            </a:extLst>
+          </p:cNvPr>
+          <p:cNvSpPr/>
+          <p:nvPr/>
+        </p:nvSpPr>
+        <p:spPr>
+          <a:xfrm>
+            <a:off x="5876579" y="4066933"/>
+            <a:ext cx="177281" cy="177281"/>
+          </a:xfrm>
+          <a:prstGeom prst="ellipse">
+            <a:avLst/>
+          </a:prstGeom>
+          <a:solidFill>
+            <a:schemeClr val="bg1">
+              <a:lumMod val="95000"/>
+            </a:schemeClr>
+          </a:solidFill>
+          <a:ln w="57150">
+            <a:solidFill>
+              <a:schemeClr val="accent1">
+                <a:lumMod val="75000"/>
+              </a:schemeClr>
+            </a:solidFill>
+          </a:ln>
+        </p:spPr>
+        <p:style>
+          <a:lnRef idx="2">
+            <a:schemeClr val="accent1">
+              <a:shade val="50000"/>
+            </a:schemeClr>
+          </a:lnRef>
+          <a:fillRef idx="1">
+            <a:schemeClr val="accent1"/>
+          </a:fillRef>
+          <a:effectRef idx="0">
+            <a:schemeClr val="accent1"/>
+          </a:effectRef>
+          <a:fontRef idx="minor">
+            <a:schemeClr val="lt1"/>
+          </a:fontRef>
+        </p:style>
+        <p:txBody>
+          <a:bodyPr rtlCol="0" anchor="ctr"/>
+          <a:lstStyle/>
+          <a:p>
+            <a:pPr algn="ctr"/>
+            <a:endParaRPr lang="ko-KR" altLang="en-US" dirty="0">
+              <a:solidFill>
+                <a:prstClr val="white"/>
+              </a:solidFill>
+            </a:endParaRPr>
+          </a:p>
+        </p:txBody>
+      </p:sp>
+      <p:sp>
+        <p:nvSpPr>
+          <p:cNvPr id="29" name="타원 28">
+            <a:extLst>
+              <a:ext uri="{FF2B5EF4-FFF2-40B4-BE49-F238E27FC236}">
+                <a16:creationId xmlns:a16="http://schemas.microsoft.com/office/drawing/2014/main" id="{F6F725CF-D06D-469C-9213-E99C03BF34C7}"/>
+              </a:ext>
+            </a:extLst>
+          </p:cNvPr>
+          <p:cNvSpPr/>
+          <p:nvPr/>
+        </p:nvSpPr>
+        <p:spPr>
+          <a:xfrm>
+            <a:off x="6572839" y="3848304"/>
+            <a:ext cx="177281" cy="177281"/>
+          </a:xfrm>
+          <a:prstGeom prst="ellipse">
+            <a:avLst/>
+          </a:prstGeom>
+          <a:solidFill>
+            <a:schemeClr val="bg1">
+              <a:lumMod val="95000"/>
+            </a:schemeClr>
+          </a:solidFill>
+          <a:ln w="57150">
+            <a:solidFill>
+              <a:schemeClr val="accent1">
+                <a:lumMod val="75000"/>
+              </a:schemeClr>
+            </a:solidFill>
+          </a:ln>
+        </p:spPr>
+        <p:style>
+          <a:lnRef idx="2">
+            <a:schemeClr val="accent1">
+              <a:shade val="50000"/>
+            </a:schemeClr>
+          </a:lnRef>
+          <a:fillRef idx="1">
+            <a:schemeClr val="accent1"/>
+          </a:fillRef>
+          <a:effectRef idx="0">
+            <a:schemeClr val="accent1"/>
+          </a:effectRef>
+          <a:fontRef idx="minor">
+            <a:schemeClr val="lt1"/>
+          </a:fontRef>
+        </p:style>
+        <p:txBody>
+          <a:bodyPr rtlCol="0" anchor="ctr"/>
+          <a:lstStyle/>
+          <a:p>
+            <a:pPr algn="ctr"/>
+            <a:endParaRPr lang="ko-KR" altLang="en-US">
+              <a:solidFill>
+                <a:prstClr val="white"/>
+              </a:solidFill>
+            </a:endParaRPr>
+          </a:p>
+        </p:txBody>
+      </p:sp>
+      <p:sp>
+        <p:nvSpPr>
+          <p:cNvPr id="30" name="타원 29">
+            <a:extLst>
+              <a:ext uri="{FF2B5EF4-FFF2-40B4-BE49-F238E27FC236}">
+                <a16:creationId xmlns:a16="http://schemas.microsoft.com/office/drawing/2014/main" id="{7FD3846A-786E-4BCA-9617-8F32A81C48D2}"/>
+              </a:ext>
+            </a:extLst>
+          </p:cNvPr>
+          <p:cNvSpPr/>
+          <p:nvPr/>
+        </p:nvSpPr>
+        <p:spPr>
+          <a:xfrm>
+            <a:off x="7249554" y="4058601"/>
+            <a:ext cx="177281" cy="177281"/>
+          </a:xfrm>
+          <a:prstGeom prst="ellipse">
+            <a:avLst/>
+          </a:prstGeom>
+          <a:solidFill>
+            <a:schemeClr val="bg1">
+              <a:lumMod val="95000"/>
+            </a:schemeClr>
+          </a:solidFill>
+          <a:ln w="57150">
+            <a:solidFill>
+              <a:schemeClr val="accent1">
+                <a:lumMod val="75000"/>
+              </a:schemeClr>
+            </a:solidFill>
+          </a:ln>
+        </p:spPr>
+        <p:style>
+          <a:lnRef idx="2">
+            <a:schemeClr val="accent1">
+              <a:shade val="50000"/>
+            </a:schemeClr>
+          </a:lnRef>
+          <a:fillRef idx="1">
+            <a:schemeClr val="accent1"/>
+          </a:fillRef>
+          <a:effectRef idx="0">
+            <a:schemeClr val="accent1"/>
+          </a:effectRef>
+          <a:fontRef idx="minor">
+            <a:schemeClr val="lt1"/>
+          </a:fontRef>
+        </p:style>
+        <p:txBody>
+          <a:bodyPr rtlCol="0" anchor="ctr"/>
+          <a:lstStyle/>
+          <a:p>
+            <a:pPr algn="ctr"/>
+            <a:endParaRPr lang="ko-KR" altLang="en-US">
+              <a:solidFill>
+                <a:prstClr val="white"/>
+              </a:solidFill>
+            </a:endParaRPr>
+          </a:p>
+        </p:txBody>
+      </p:sp>
+      <p:cxnSp>
+        <p:nvCxnSpPr>
+          <p:cNvPr id="34" name="직선 연결선 33">
+            <a:extLst>
+              <a:ext uri="{FF2B5EF4-FFF2-40B4-BE49-F238E27FC236}">
+                <a16:creationId xmlns:a16="http://schemas.microsoft.com/office/drawing/2014/main" id="{51C7BBD1-375B-49BA-A0BD-2214F2BA52B3}"/>
+              </a:ext>
+            </a:extLst>
+          </p:cNvPr>
+          <p:cNvCxnSpPr>
+            <a:cxnSpLocks/>
+            <a:stCxn id="52" idx="1"/>
+            <a:endCxn id="49" idx="6"/>
+          </p:cNvCxnSpPr>
+          <p:nvPr/>
+        </p:nvCxnSpPr>
+        <p:spPr>
+          <a:xfrm flipH="1" flipV="1">
+            <a:off x="4444798" y="3978293"/>
+            <a:ext cx="343197" cy="186456"/>
+          </a:xfrm>
+          <a:prstGeom prst="line">
+            <a:avLst/>
+          </a:prstGeom>
+          <a:ln w="38100">
+            <a:solidFill>
+              <a:schemeClr val="accent1">
+                <a:lumMod val="75000"/>
+              </a:schemeClr>
+            </a:solidFill>
+          </a:ln>
+        </p:spPr>
+        <p:style>
+          <a:lnRef idx="1">
+            <a:schemeClr val="accent1"/>
+          </a:lnRef>
+          <a:fillRef idx="0">
+            <a:schemeClr val="accent1"/>
+          </a:fillRef>
+          <a:effectRef idx="0">
+            <a:schemeClr val="accent1"/>
+          </a:effectRef>
+          <a:fontRef idx="minor">
+            <a:schemeClr val="tx1"/>
+          </a:fontRef>
+        </p:style>
+      </p:cxnSp>
+      <p:sp>
+        <p:nvSpPr>
+          <p:cNvPr id="49" name="타원 48">
+            <a:extLst>
+              <a:ext uri="{FF2B5EF4-FFF2-40B4-BE49-F238E27FC236}">
+                <a16:creationId xmlns:a16="http://schemas.microsoft.com/office/drawing/2014/main" id="{C98AE206-A76C-49AE-BD34-68D9AE8804A0}"/>
+              </a:ext>
+            </a:extLst>
+          </p:cNvPr>
+          <p:cNvSpPr/>
+          <p:nvPr/>
+        </p:nvSpPr>
+        <p:spPr>
+          <a:xfrm>
+            <a:off x="4153308" y="3832548"/>
+            <a:ext cx="291490" cy="291490"/>
+          </a:xfrm>
+          <a:prstGeom prst="ellipse">
+            <a:avLst/>
+          </a:prstGeom>
+          <a:solidFill>
+            <a:schemeClr val="tx1">
+              <a:lumMod val="85000"/>
+              <a:lumOff val="15000"/>
+            </a:schemeClr>
+          </a:solidFill>
+          <a:ln w="76200">
+            <a:solidFill>
+              <a:schemeClr val="accent1">
+                <a:lumMod val="75000"/>
+              </a:schemeClr>
+            </a:solidFill>
+          </a:ln>
+        </p:spPr>
+        <p:style>
+          <a:lnRef idx="2">
+            <a:schemeClr val="accent1">
+              <a:shade val="50000"/>
+            </a:schemeClr>
+          </a:lnRef>
+          <a:fillRef idx="1">
+            <a:schemeClr val="accent1"/>
+          </a:fillRef>
+          <a:effectRef idx="0">
+            <a:schemeClr val="accent1"/>
+          </a:effectRef>
+          <a:fontRef idx="minor">
+            <a:schemeClr val="lt1"/>
+          </a:fontRef>
+        </p:style>
+        <p:txBody>
+          <a:bodyPr rtlCol="0" anchor="ctr"/>
+          <a:lstStyle/>
+          <a:p>
+            <a:pPr algn="ctr"/>
+            <a:endParaRPr lang="ko-KR" altLang="en-US">
+              <a:solidFill>
+                <a:prstClr val="white"/>
+              </a:solidFill>
+            </a:endParaRPr>
+          </a:p>
+        </p:txBody>
+      </p:sp>
+      <p:sp>
+        <p:nvSpPr>
+          <p:cNvPr id="50" name="타원 49">
+            <a:extLst>
+              <a:ext uri="{FF2B5EF4-FFF2-40B4-BE49-F238E27FC236}">
+                <a16:creationId xmlns:a16="http://schemas.microsoft.com/office/drawing/2014/main" id="{BAB391D1-FC22-4C14-B6A8-DC1532650433}"/>
+              </a:ext>
+            </a:extLst>
+          </p:cNvPr>
+          <p:cNvSpPr/>
+          <p:nvPr/>
+        </p:nvSpPr>
+        <p:spPr>
+          <a:xfrm>
+            <a:off x="4210412" y="3889652"/>
+            <a:ext cx="177281" cy="177281"/>
+          </a:xfrm>
+          <a:prstGeom prst="ellipse">
+            <a:avLst/>
+          </a:prstGeom>
+          <a:solidFill>
+            <a:schemeClr val="bg1">
+              <a:lumMod val="95000"/>
+            </a:schemeClr>
+          </a:solidFill>
+          <a:ln w="57150">
+            <a:solidFill>
+              <a:schemeClr val="accent1">
+                <a:lumMod val="75000"/>
+              </a:schemeClr>
+            </a:solidFill>
+          </a:ln>
+        </p:spPr>
+        <p:style>
+          <a:lnRef idx="2">
+            <a:schemeClr val="accent1">
+              <a:shade val="50000"/>
+            </a:schemeClr>
+          </a:lnRef>
+          <a:fillRef idx="1">
+            <a:schemeClr val="accent1"/>
+          </a:fillRef>
+          <a:effectRef idx="0">
+            <a:schemeClr val="accent1"/>
+          </a:effectRef>
+          <a:fontRef idx="minor">
+            <a:schemeClr val="lt1"/>
+          </a:fontRef>
+        </p:style>
+        <p:txBody>
+          <a:bodyPr rtlCol="0" anchor="ctr"/>
+          <a:lstStyle/>
+          <a:p>
+            <a:pPr algn="ctr"/>
+            <a:endParaRPr lang="ko-KR" altLang="en-US">
+              <a:solidFill>
+                <a:prstClr val="white"/>
+              </a:solidFill>
+            </a:endParaRPr>
+          </a:p>
+        </p:txBody>
+      </p:sp>
+      <p:sp>
+        <p:nvSpPr>
+          <p:cNvPr id="51" name="타원 50">
+            <a:extLst>
+              <a:ext uri="{FF2B5EF4-FFF2-40B4-BE49-F238E27FC236}">
+                <a16:creationId xmlns:a16="http://schemas.microsoft.com/office/drawing/2014/main" id="{B41761FB-9367-4737-A8D2-586F994862CD}"/>
+              </a:ext>
+            </a:extLst>
+          </p:cNvPr>
+          <p:cNvSpPr/>
+          <p:nvPr/>
+        </p:nvSpPr>
+        <p:spPr>
+          <a:xfrm>
+            <a:off x="4704929" y="4081683"/>
+            <a:ext cx="291490" cy="291490"/>
+          </a:xfrm>
+          <a:prstGeom prst="ellipse">
+            <a:avLst/>
+          </a:prstGeom>
+          <a:solidFill>
+            <a:schemeClr val="tx1">
+              <a:lumMod val="85000"/>
+              <a:lumOff val="15000"/>
+            </a:schemeClr>
+          </a:solidFill>
+          <a:ln w="76200">
+            <a:solidFill>
+              <a:schemeClr val="accent1">
+                <a:lumMod val="75000"/>
+              </a:schemeClr>
+            </a:solidFill>
+          </a:ln>
+        </p:spPr>
+        <p:style>
+          <a:lnRef idx="2">
+            <a:schemeClr val="accent1">
+              <a:shade val="50000"/>
+            </a:schemeClr>
+          </a:lnRef>
+          <a:fillRef idx="1">
+            <a:schemeClr val="accent1"/>
+          </a:fillRef>
+          <a:effectRef idx="0">
+            <a:schemeClr val="accent1"/>
+          </a:effectRef>
+          <a:fontRef idx="minor">
+            <a:schemeClr val="lt1"/>
+          </a:fontRef>
+        </p:style>
+        <p:txBody>
+          <a:bodyPr rtlCol="0" anchor="ctr"/>
+          <a:lstStyle/>
+          <a:p>
+            <a:pPr algn="ctr"/>
+            <a:endParaRPr lang="ko-KR" altLang="en-US">
+              <a:solidFill>
+                <a:prstClr val="white"/>
+              </a:solidFill>
+            </a:endParaRPr>
+          </a:p>
+        </p:txBody>
+      </p:sp>
+      <p:sp>
+        <p:nvSpPr>
+          <p:cNvPr id="52" name="타원 51">
+            <a:extLst>
+              <a:ext uri="{FF2B5EF4-FFF2-40B4-BE49-F238E27FC236}">
+                <a16:creationId xmlns:a16="http://schemas.microsoft.com/office/drawing/2014/main" id="{6D761FED-F71C-41AC-8922-55A394A7E0D5}"/>
+              </a:ext>
+            </a:extLst>
+          </p:cNvPr>
+          <p:cNvSpPr/>
+          <p:nvPr/>
+        </p:nvSpPr>
+        <p:spPr>
+          <a:xfrm>
+            <a:off x="4762033" y="4138787"/>
+            <a:ext cx="177281" cy="177281"/>
+          </a:xfrm>
+          <a:prstGeom prst="ellipse">
+            <a:avLst/>
+          </a:prstGeom>
+          <a:solidFill>
+            <a:schemeClr val="bg1">
+              <a:lumMod val="95000"/>
+            </a:schemeClr>
+          </a:solidFill>
+          <a:ln w="57150">
+            <a:solidFill>
+              <a:schemeClr val="accent1">
+                <a:lumMod val="75000"/>
+              </a:schemeClr>
+            </a:solidFill>
+          </a:ln>
+        </p:spPr>
+        <p:style>
+          <a:lnRef idx="2">
+            <a:schemeClr val="accent1">
+              <a:shade val="50000"/>
+            </a:schemeClr>
+          </a:lnRef>
+          <a:fillRef idx="1">
+            <a:schemeClr val="accent1"/>
+          </a:fillRef>
+          <a:effectRef idx="0">
+            <a:schemeClr val="accent1"/>
+          </a:effectRef>
+          <a:fontRef idx="minor">
+            <a:schemeClr val="lt1"/>
+          </a:fontRef>
+        </p:style>
+        <p:txBody>
+          <a:bodyPr rtlCol="0" anchor="ctr"/>
+          <a:lstStyle/>
+          <a:p>
+            <a:pPr algn="ctr"/>
+            <a:endParaRPr lang="ko-KR" altLang="en-US">
+              <a:solidFill>
+                <a:prstClr val="white"/>
+              </a:solidFill>
+            </a:endParaRPr>
+          </a:p>
+        </p:txBody>
+      </p:sp>
+      <p:cxnSp>
+        <p:nvCxnSpPr>
+          <p:cNvPr id="53" name="직선 연결선 52">
+            <a:extLst>
+              <a:ext uri="{FF2B5EF4-FFF2-40B4-BE49-F238E27FC236}">
+                <a16:creationId xmlns:a16="http://schemas.microsoft.com/office/drawing/2014/main" id="{4E741F69-0061-4655-8A79-43C7E7D20402}"/>
+              </a:ext>
+            </a:extLst>
+          </p:cNvPr>
+          <p:cNvCxnSpPr>
+            <a:cxnSpLocks/>
+            <a:stCxn id="27" idx="2"/>
+            <a:endCxn id="26" idx="6"/>
+          </p:cNvCxnSpPr>
+          <p:nvPr/>
+        </p:nvCxnSpPr>
+        <p:spPr>
+          <a:xfrm flipH="1" flipV="1">
+            <a:off x="6807226" y="3936945"/>
+            <a:ext cx="385224" cy="210297"/>
+          </a:xfrm>
+          <a:prstGeom prst="line">
+            <a:avLst/>
+          </a:prstGeom>
+          <a:ln w="38100">
+            <a:solidFill>
+              <a:schemeClr val="accent1">
+                <a:lumMod val="75000"/>
+              </a:schemeClr>
+            </a:solidFill>
+          </a:ln>
+        </p:spPr>
+        <p:style>
+          <a:lnRef idx="1">
+            <a:schemeClr val="accent1"/>
+          </a:lnRef>
+          <a:fillRef idx="0">
+            <a:schemeClr val="accent1"/>
+          </a:fillRef>
+          <a:effectRef idx="0">
+            <a:schemeClr val="accent1"/>
+          </a:effectRef>
+          <a:fontRef idx="minor">
+            <a:schemeClr val="tx1"/>
+          </a:fontRef>
+        </p:style>
+      </p:cxnSp>
+      <p:cxnSp>
+        <p:nvCxnSpPr>
+          <p:cNvPr id="56" name="직선 연결선 55">
+            <a:extLst>
+              <a:ext uri="{FF2B5EF4-FFF2-40B4-BE49-F238E27FC236}">
+                <a16:creationId xmlns:a16="http://schemas.microsoft.com/office/drawing/2014/main" id="{D6664432-0B0A-4CA9-B01A-414F6E26FDD3}"/>
+              </a:ext>
+            </a:extLst>
+          </p:cNvPr>
+          <p:cNvCxnSpPr>
+            <a:cxnSpLocks/>
+            <a:stCxn id="14" idx="6"/>
+            <a:endCxn id="49" idx="2"/>
+          </p:cNvCxnSpPr>
+          <p:nvPr/>
+        </p:nvCxnSpPr>
+        <p:spPr>
+          <a:xfrm flipV="1">
+            <a:off x="3881248" y="3978293"/>
+            <a:ext cx="272060" cy="249135"/>
+          </a:xfrm>
+          <a:prstGeom prst="line">
+            <a:avLst/>
+          </a:prstGeom>
+          <a:ln w="38100">
+            <a:solidFill>
+              <a:schemeClr val="accent1">
+                <a:lumMod val="75000"/>
+              </a:schemeClr>
+            </a:solidFill>
+          </a:ln>
+        </p:spPr>
+        <p:style>
+          <a:lnRef idx="1">
+            <a:schemeClr val="accent1"/>
+          </a:lnRef>
+          <a:fillRef idx="0">
+            <a:schemeClr val="accent1"/>
+          </a:fillRef>
+          <a:effectRef idx="0">
+            <a:schemeClr val="accent1"/>
+          </a:effectRef>
+          <a:fontRef idx="minor">
+            <a:schemeClr val="tx1"/>
+          </a:fontRef>
+        </p:style>
+      </p:cxnSp>
+      <p:cxnSp>
+        <p:nvCxnSpPr>
+          <p:cNvPr id="59" name="직선 연결선 58">
+            <a:extLst>
+              <a:ext uri="{FF2B5EF4-FFF2-40B4-BE49-F238E27FC236}">
+                <a16:creationId xmlns:a16="http://schemas.microsoft.com/office/drawing/2014/main" id="{38C9212C-BF44-4188-82D1-23832FD7761B}"/>
+              </a:ext>
+            </a:extLst>
+          </p:cNvPr>
+          <p:cNvCxnSpPr>
+            <a:cxnSpLocks/>
+            <a:stCxn id="14" idx="2"/>
+            <a:endCxn id="11" idx="6"/>
+          </p:cNvCxnSpPr>
+          <p:nvPr/>
+        </p:nvCxnSpPr>
+        <p:spPr>
+          <a:xfrm flipH="1" flipV="1">
+            <a:off x="3309283" y="3984150"/>
+            <a:ext cx="280475" cy="243278"/>
+          </a:xfrm>
+          <a:prstGeom prst="line">
+            <a:avLst/>
+          </a:prstGeom>
+          <a:ln w="38100">
+            <a:solidFill>
+              <a:schemeClr val="accent1">
+                <a:lumMod val="75000"/>
+              </a:schemeClr>
+            </a:solidFill>
+          </a:ln>
+        </p:spPr>
+        <p:style>
+          <a:lnRef idx="1">
+            <a:schemeClr val="accent1"/>
+          </a:lnRef>
+          <a:fillRef idx="0">
+            <a:schemeClr val="accent1"/>
+          </a:fillRef>
+          <a:effectRef idx="0">
+            <a:schemeClr val="accent1"/>
+          </a:effectRef>
+          <a:fontRef idx="minor">
+            <a:schemeClr val="tx1"/>
+          </a:fontRef>
+        </p:style>
+      </p:cxnSp>
+      <p:cxnSp>
+        <p:nvCxnSpPr>
+          <p:cNvPr id="62" name="직선 연결선 61">
+            <a:extLst>
+              <a:ext uri="{FF2B5EF4-FFF2-40B4-BE49-F238E27FC236}">
+                <a16:creationId xmlns:a16="http://schemas.microsoft.com/office/drawing/2014/main" id="{9238767E-107D-443B-A824-CA650F63CF09}"/>
+              </a:ext>
+            </a:extLst>
+          </p:cNvPr>
+          <p:cNvCxnSpPr>
+            <a:cxnSpLocks/>
+            <a:stCxn id="10" idx="6"/>
+            <a:endCxn id="11" idx="2"/>
+          </p:cNvCxnSpPr>
+          <p:nvPr/>
+        </p:nvCxnSpPr>
+        <p:spPr>
+          <a:xfrm flipV="1">
+            <a:off x="2760795" y="3984150"/>
+            <a:ext cx="256998" cy="269111"/>
+          </a:xfrm>
+          <a:prstGeom prst="line">
+            <a:avLst/>
+          </a:prstGeom>
+          <a:ln w="38100">
+            <a:solidFill>
+              <a:schemeClr val="accent1">
+                <a:lumMod val="75000"/>
+              </a:schemeClr>
+            </a:solidFill>
+          </a:ln>
+        </p:spPr>
+        <p:style>
+          <a:lnRef idx="1">
+            <a:schemeClr val="accent1"/>
+          </a:lnRef>
+          <a:fillRef idx="0">
+            <a:schemeClr val="accent1"/>
+          </a:fillRef>
+          <a:effectRef idx="0">
+            <a:schemeClr val="accent1"/>
+          </a:effectRef>
+          <a:fontRef idx="minor">
+            <a:schemeClr val="tx1"/>
+          </a:fontRef>
+        </p:style>
+      </p:cxnSp>
+      <p:cxnSp>
+        <p:nvCxnSpPr>
+          <p:cNvPr id="67" name="직선 연결선 66">
+            <a:extLst>
+              <a:ext uri="{FF2B5EF4-FFF2-40B4-BE49-F238E27FC236}">
+                <a16:creationId xmlns:a16="http://schemas.microsoft.com/office/drawing/2014/main" id="{F33E5833-85D3-414E-A121-52C9A2CA152F}"/>
+              </a:ext>
+            </a:extLst>
+          </p:cNvPr>
+          <p:cNvCxnSpPr>
+            <a:cxnSpLocks/>
+            <a:stCxn id="25" idx="6"/>
+            <a:endCxn id="26" idx="2"/>
+          </p:cNvCxnSpPr>
+          <p:nvPr/>
+        </p:nvCxnSpPr>
+        <p:spPr>
+          <a:xfrm flipV="1">
+            <a:off x="6111590" y="3936945"/>
+            <a:ext cx="404146" cy="220305"/>
+          </a:xfrm>
+          <a:prstGeom prst="line">
+            <a:avLst/>
+          </a:prstGeom>
+          <a:ln w="38100">
+            <a:solidFill>
+              <a:schemeClr val="accent1">
+                <a:lumMod val="75000"/>
+              </a:schemeClr>
+            </a:solidFill>
+          </a:ln>
+        </p:spPr>
+        <p:style>
+          <a:lnRef idx="1">
+            <a:schemeClr val="accent1"/>
+          </a:lnRef>
+          <a:fillRef idx="0">
+            <a:schemeClr val="accent1"/>
+          </a:fillRef>
+          <a:effectRef idx="0">
+            <a:schemeClr val="accent1"/>
+          </a:effectRef>
+          <a:fontRef idx="minor">
+            <a:schemeClr val="tx1"/>
+          </a:fontRef>
+        </p:style>
+      </p:cxnSp>
+      <p:sp>
+        <p:nvSpPr>
+          <p:cNvPr id="70" name="직사각형 69">
+            <a:extLst>
+              <a:ext uri="{FF2B5EF4-FFF2-40B4-BE49-F238E27FC236}">
+                <a16:creationId xmlns:a16="http://schemas.microsoft.com/office/drawing/2014/main" id="{B7E6E8B0-8F79-40D5-93CD-DD05110D1150}"/>
+              </a:ext>
+            </a:extLst>
+          </p:cNvPr>
+          <p:cNvSpPr/>
+          <p:nvPr/>
+        </p:nvSpPr>
+        <p:spPr>
+          <a:xfrm>
+            <a:off x="3453348" y="4557282"/>
+            <a:ext cx="2860315" cy="333617"/>
+          </a:xfrm>
+          <a:prstGeom prst="rect">
+            <a:avLst/>
+          </a:prstGeom>
+          <a:noFill/>
+        </p:spPr>
+        <p:txBody>
+          <a:bodyPr wrap="square">
+            <a:spAutoFit/>
+          </a:bodyPr>
+          <a:lstStyle/>
+          <a:p>
+            <a:pPr lvl="0">
+              <a:lnSpc>
+                <a:spcPct val="150000"/>
+              </a:lnSpc>
+              <a:defRPr/>
+            </a:pPr>
+            <a:r>
+              <a:rPr lang="ko-KR" altLang="en-US" sz="1200">
+                <a:solidFill>
+                  <a:prstClr val="black">
+                    <a:lumMod val="85000"/>
+                    <a:lumOff val="15000"/>
+                  </a:prstClr>
+                </a:solidFill>
+                <a:latin typeface="아리따-돋움(TTF)-Bold" panose="02020603020101020101" pitchFamily="18" charset="-127"/>
+                <a:ea typeface="아리따-돋움(TTF)-Bold" panose="02020603020101020101" pitchFamily="18" charset="-127"/>
+              </a:rPr>
+              <a:t>장거리</a:t>
+            </a:r>
+            <a:endParaRPr lang="en-US" altLang="ko-KR" sz="1200" dirty="0">
+              <a:solidFill>
+                <a:prstClr val="black">
+                  <a:lumMod val="85000"/>
+                  <a:lumOff val="15000"/>
+                </a:prstClr>
+              </a:solidFill>
+              <a:latin typeface="아리따-돋움(TTF)-Bold" panose="02020603020101020101" pitchFamily="18" charset="-127"/>
+              <a:ea typeface="아리따-돋움(TTF)-Bold" panose="02020603020101020101" pitchFamily="18" charset="-127"/>
+            </a:endParaRPr>
+          </a:p>
+        </p:txBody>
+      </p:sp>
+      <p:sp>
+        <p:nvSpPr>
+          <p:cNvPr id="71" name="직사각형 70">
+            <a:extLst>
+              <a:ext uri="{FF2B5EF4-FFF2-40B4-BE49-F238E27FC236}">
+                <a16:creationId xmlns:a16="http://schemas.microsoft.com/office/drawing/2014/main" id="{7460FAC6-669B-4AB0-89D5-AE4A408331F0}"/>
+              </a:ext>
+            </a:extLst>
+          </p:cNvPr>
+          <p:cNvSpPr/>
+          <p:nvPr/>
+        </p:nvSpPr>
+        <p:spPr>
+          <a:xfrm>
+            <a:off x="6515736" y="4557282"/>
+            <a:ext cx="2860315" cy="333617"/>
+          </a:xfrm>
+          <a:prstGeom prst="rect">
+            <a:avLst/>
+          </a:prstGeom>
+          <a:noFill/>
+        </p:spPr>
+        <p:txBody>
+          <a:bodyPr wrap="square">
+            <a:spAutoFit/>
+          </a:bodyPr>
+          <a:lstStyle/>
+          <a:p>
+            <a:pPr lvl="0">
+              <a:lnSpc>
+                <a:spcPct val="150000"/>
+              </a:lnSpc>
+              <a:defRPr/>
+            </a:pPr>
+            <a:r>
+              <a:rPr lang="ko-KR" altLang="en-US" sz="1200" dirty="0">
+                <a:solidFill>
+                  <a:prstClr val="black">
+                    <a:lumMod val="85000"/>
+                    <a:lumOff val="15000"/>
+                  </a:prstClr>
+                </a:solidFill>
+                <a:latin typeface="아리따-돋움(TTF)-Bold" panose="02020603020101020101" pitchFamily="18" charset="-127"/>
+                <a:ea typeface="아리따-돋움(TTF)-Bold" panose="02020603020101020101" pitchFamily="18" charset="-127"/>
+              </a:rPr>
+              <a:t>단거리</a:t>
+            </a:r>
+            <a:endParaRPr lang="en-US" altLang="ko-KR" sz="1200" dirty="0">
+              <a:solidFill>
+                <a:prstClr val="black">
+                  <a:lumMod val="85000"/>
+                  <a:lumOff val="15000"/>
+                </a:prstClr>
+              </a:solidFill>
+              <a:latin typeface="아리따-돋움(TTF)-Bold" panose="02020603020101020101" pitchFamily="18" charset="-127"/>
+              <a:ea typeface="아리따-돋움(TTF)-Bold" panose="02020603020101020101" pitchFamily="18" charset="-127"/>
+            </a:endParaRPr>
           </a:p>
         </p:txBody>
       </p:sp>
     </p:spTree>
     <p:extLst>
       <p:ext uri="{BB962C8B-B14F-4D97-AF65-F5344CB8AC3E}">
-        <p14:creationId xmlns:p14="http://schemas.microsoft.com/office/powerpoint/2010/main" val="4290430429"/>
+        <p14:creationId xmlns:p14="http://schemas.microsoft.com/office/powerpoint/2010/main" val="2442900214"/>
       </p:ext>
     </p:extLst>
   </p:cSld>

</xml_diff>